<commit_message>
added much better simulation duration. better text for foundation and implementations
</commit_message>
<xml_diff>
--- a/figures/encodings.pptx
+++ b/figures/encodings.pptx
@@ -5,17 +5,18 @@
     <p:sldMasterId id="2147483648" r:id="rId6"/>
   </p:sldMasterIdLst>
   <p:notesMasterIdLst>
-    <p:notesMasterId r:id="rId12"/>
+    <p:notesMasterId r:id="rId13"/>
   </p:notesMasterIdLst>
   <p:handoutMasterIdLst>
-    <p:handoutMasterId r:id="rId13"/>
+    <p:handoutMasterId r:id="rId14"/>
   </p:handoutMasterIdLst>
   <p:sldIdLst>
     <p:sldId id="256" r:id="rId7"/>
     <p:sldId id="268" r:id="rId8"/>
-    <p:sldId id="270" r:id="rId9"/>
-    <p:sldId id="267" r:id="rId10"/>
-    <p:sldId id="269" r:id="rId11"/>
+    <p:sldId id="267" r:id="rId9"/>
+    <p:sldId id="269" r:id="rId10"/>
+    <p:sldId id="270" r:id="rId11"/>
+    <p:sldId id="271" r:id="rId12"/>
   </p:sldIdLst>
   <p:sldSz cx="12192000" cy="6858000"/>
   <p:notesSz cx="6797675" cy="9926638"/>
@@ -300,7 +301,7 @@
             <a:fld id="{06F053B8-FB04-4AB0-A080-AB7AE9E56315}" type="datetimeFigureOut">
               <a:rPr lang="de-DE" smtClean="0"/>
               <a:pPr/>
-              <a:t>30.11.2023</a:t>
+              <a:t>01.12.2023</a:t>
             </a:fld>
             <a:endParaRPr lang="de-DE" dirty="0"/>
           </a:p>
@@ -467,7 +468,7 @@
             <a:fld id="{A4D91BE1-7962-4D26-99A9-07CE70F19314}" type="datetimeFigureOut">
               <a:rPr lang="de-DE" smtClean="0"/>
               <a:pPr/>
-              <a:t>30.11.2023</a:t>
+              <a:t>01.12.2023</a:t>
             </a:fld>
             <a:endParaRPr lang="de-DE" dirty="0"/>
           </a:p>
@@ -960,126 +961,6 @@
     <p:extLst>
       <p:ext uri="{BB962C8B-B14F-4D97-AF65-F5344CB8AC3E}">
         <p14:creationId xmlns:p14="http://schemas.microsoft.com/office/powerpoint/2010/main" val="3553741211"/>
-      </p:ext>
-    </p:extLst>
-  </p:cSld>
-  <p:clrMapOvr>
-    <a:masterClrMapping/>
-  </p:clrMapOvr>
-</p:notes>
-</file>
-
-<file path=ppt/notesSlides/notesSlide3.xml><?xml version="1.0" encoding="utf-8"?>
-<p:notes xmlns:a="http://schemas.openxmlformats.org/drawingml/2006/main" xmlns:r="http://schemas.openxmlformats.org/officeDocument/2006/relationships" xmlns:p="http://schemas.openxmlformats.org/presentationml/2006/main">
-  <p:cSld>
-    <p:spTree>
-      <p:nvGrpSpPr>
-        <p:cNvPr id="1" name=""/>
-        <p:cNvGrpSpPr/>
-        <p:nvPr/>
-      </p:nvGrpSpPr>
-      <p:grpSpPr>
-        <a:xfrm>
-          <a:off x="0" y="0"/>
-          <a:ext cx="0" cy="0"/>
-          <a:chOff x="0" y="0"/>
-          <a:chExt cx="0" cy="0"/>
-        </a:xfrm>
-      </p:grpSpPr>
-      <p:sp>
-        <p:nvSpPr>
-          <p:cNvPr id="2" name="Slide Image Placeholder 1"/>
-          <p:cNvSpPr>
-            <a:spLocks noGrp="1" noRot="1" noChangeAspect="1"/>
-          </p:cNvSpPr>
-          <p:nvPr>
-            <p:ph type="sldImg"/>
-          </p:nvPr>
-        </p:nvSpPr>
-        <p:spPr/>
-      </p:sp>
-      <p:sp>
-        <p:nvSpPr>
-          <p:cNvPr id="3" name="Notes Placeholder 2"/>
-          <p:cNvSpPr>
-            <a:spLocks noGrp="1"/>
-          </p:cNvSpPr>
-          <p:nvPr>
-            <p:ph type="body" idx="1"/>
-          </p:nvPr>
-        </p:nvSpPr>
-        <p:spPr/>
-        <p:txBody>
-          <a:bodyPr/>
-          <a:lstStyle/>
-          <a:p>
-            <a:pPr marL="0" marR="0" lvl="0" indent="0" algn="l" defTabSz="1219170" rtl="0" eaLnBrk="1" fontAlgn="auto" latinLnBrk="0" hangingPunct="1">
-              <a:lnSpc>
-                <a:spcPct val="100000"/>
-              </a:lnSpc>
-              <a:spcBef>
-                <a:spcPts val="0"/>
-              </a:spcBef>
-              <a:spcAft>
-                <a:spcPts val="0"/>
-              </a:spcAft>
-              <a:buClrTx/>
-              <a:buSzTx/>
-              <a:buFontTx/>
-              <a:buNone/>
-              <a:tabLst/>
-              <a:defRPr/>
-            </a:pPr>
-            <a:r>
-              <a:rPr kumimoji="0" lang="en-US" sz="1600" b="0" i="0" u="none" strike="noStrike" kern="0" cap="none" spc="0" normalizeH="0" baseline="0" noProof="0" dirty="0">
-                <a:ln>
-                  <a:noFill/>
-                </a:ln>
-                <a:solidFill>
-                  <a:prstClr val="black"/>
-                </a:solidFill>
-                <a:effectLst/>
-                <a:uLnTx/>
-                <a:uFillTx/>
-                <a:latin typeface="Calibri"/>
-                <a:cs typeface="Arial"/>
-              </a:rPr>
-              <a:t>Apollo Case Study</a:t>
-            </a:r>
-          </a:p>
-          <a:p>
-            <a:endParaRPr lang="en-US" dirty="0"/>
-          </a:p>
-        </p:txBody>
-      </p:sp>
-      <p:sp>
-        <p:nvSpPr>
-          <p:cNvPr id="4" name="Slide Number Placeholder 3"/>
-          <p:cNvSpPr>
-            <a:spLocks noGrp="1"/>
-          </p:cNvSpPr>
-          <p:nvPr>
-            <p:ph type="sldNum" sz="quarter" idx="5"/>
-          </p:nvPr>
-        </p:nvSpPr>
-        <p:spPr/>
-        <p:txBody>
-          <a:bodyPr/>
-          <a:lstStyle/>
-          <a:p>
-            <a:fld id="{3809F13D-5E3F-4C20-ADC0-C88A2660A513}" type="slidenum">
-              <a:rPr lang="de-DE" smtClean="0"/>
-              <a:pPr/>
-              <a:t>3</a:t>
-            </a:fld>
-            <a:endParaRPr lang="de-DE" dirty="0"/>
-          </a:p>
-        </p:txBody>
-      </p:sp>
-    </p:spTree>
-    <p:extLst>
-      <p:ext uri="{BB962C8B-B14F-4D97-AF65-F5344CB8AC3E}">
-        <p14:creationId xmlns:p14="http://schemas.microsoft.com/office/powerpoint/2010/main" val="1575305694"/>
       </p:ext>
     </p:extLst>
   </p:cSld>
@@ -33688,1645 +33569,6 @@
       </p:grpSpPr>
       <p:sp>
         <p:nvSpPr>
-          <p:cNvPr id="2" name="Title 1">
-            <a:extLst>
-              <a:ext uri="{FF2B5EF4-FFF2-40B4-BE49-F238E27FC236}">
-                <a16:creationId xmlns:a16="http://schemas.microsoft.com/office/drawing/2014/main" id="{2BAFC1FA-9EE9-269D-19DA-3F6D015D6116}"/>
-              </a:ext>
-            </a:extLst>
-          </p:cNvPr>
-          <p:cNvSpPr>
-            <a:spLocks noGrp="1"/>
-          </p:cNvSpPr>
-          <p:nvPr>
-            <p:ph type="title"/>
-          </p:nvPr>
-        </p:nvSpPr>
-        <p:spPr/>
-        <p:txBody>
-          <a:bodyPr/>
-          <a:lstStyle/>
-          <a:p>
-            <a:r>
-              <a:rPr lang="en-US" dirty="0"/>
-              <a:t>Chromosome encoding - Time</a:t>
-            </a:r>
-          </a:p>
-        </p:txBody>
-      </p:sp>
-      <p:sp>
-        <p:nvSpPr>
-          <p:cNvPr id="46" name="TextBox 45">
-            <a:extLst>
-              <a:ext uri="{FF2B5EF4-FFF2-40B4-BE49-F238E27FC236}">
-                <a16:creationId xmlns:a16="http://schemas.microsoft.com/office/drawing/2014/main" id="{14B56064-A9A7-1DC3-B4AA-188B63C244EC}"/>
-              </a:ext>
-            </a:extLst>
-          </p:cNvPr>
-          <p:cNvSpPr txBox="1"/>
-          <p:nvPr/>
-        </p:nvSpPr>
-        <p:spPr>
-          <a:xfrm>
-            <a:off x="1948046" y="3037977"/>
-            <a:ext cx="3864525" cy="307777"/>
-          </a:xfrm>
-          <a:prstGeom prst="rect">
-            <a:avLst/>
-          </a:prstGeom>
-          <a:noFill/>
-        </p:spPr>
-        <p:txBody>
-          <a:bodyPr wrap="square" rtlCol="0">
-            <a:spAutoFit/>
-          </a:bodyPr>
-          <a:lstStyle/>
-          <a:p>
-            <a:r>
-              <a:rPr lang="en-US" sz="1400" dirty="0">
-                <a:latin typeface="Verdana" panose="020B0604030504040204" pitchFamily="34" charset="0"/>
-                <a:ea typeface="Verdana" panose="020B0604030504040204" pitchFamily="34" charset="0"/>
-                <a:cs typeface="Verdana" panose="020B0604030504040204" pitchFamily="34" charset="0"/>
-              </a:rPr>
-              <a:t>Corresponds to timestep 1 (0.5 seconds)</a:t>
-            </a:r>
-          </a:p>
-        </p:txBody>
-      </p:sp>
-      <p:sp>
-        <p:nvSpPr>
-          <p:cNvPr id="50" name="Rectangle 49">
-            <a:extLst>
-              <a:ext uri="{FF2B5EF4-FFF2-40B4-BE49-F238E27FC236}">
-                <a16:creationId xmlns:a16="http://schemas.microsoft.com/office/drawing/2014/main" id="{5C8AA661-059B-B4DB-8FBB-7889156D6C65}"/>
-              </a:ext>
-            </a:extLst>
-          </p:cNvPr>
-          <p:cNvSpPr/>
-          <p:nvPr/>
-        </p:nvSpPr>
-        <p:spPr>
-          <a:xfrm>
-            <a:off x="406508" y="2163210"/>
-            <a:ext cx="11221096" cy="762000"/>
-          </a:xfrm>
-          <a:prstGeom prst="rect">
-            <a:avLst/>
-          </a:prstGeom>
-          <a:solidFill>
-            <a:schemeClr val="accent5">
-              <a:alpha val="50000"/>
-            </a:schemeClr>
-          </a:solidFill>
-          <a:ln>
-            <a:noFill/>
-          </a:ln>
-        </p:spPr>
-        <p:style>
-          <a:lnRef idx="0">
-            <a:scrgbClr r="0" g="0" b="0"/>
-          </a:lnRef>
-          <a:fillRef idx="0">
-            <a:scrgbClr r="0" g="0" b="0"/>
-          </a:fillRef>
-          <a:effectRef idx="0">
-            <a:scrgbClr r="0" g="0" b="0"/>
-          </a:effectRef>
-          <a:fontRef idx="minor">
-            <a:schemeClr val="lt1"/>
-          </a:fontRef>
-        </p:style>
-        <p:txBody>
-          <a:bodyPr rtlCol="0" anchor="ctr"/>
-          <a:lstStyle/>
-          <a:p>
-            <a:pPr algn="ctr"/>
-            <a:endParaRPr lang="en-US"/>
-          </a:p>
-        </p:txBody>
-      </p:sp>
-      <p:sp>
-        <p:nvSpPr>
-          <p:cNvPr id="51" name="Flowchart: Process 50">
-            <a:extLst>
-              <a:ext uri="{FF2B5EF4-FFF2-40B4-BE49-F238E27FC236}">
-                <a16:creationId xmlns:a16="http://schemas.microsoft.com/office/drawing/2014/main" id="{42EF721A-31D8-3C4F-3603-DDDDAEBF517B}"/>
-              </a:ext>
-            </a:extLst>
-          </p:cNvPr>
-          <p:cNvSpPr/>
-          <p:nvPr/>
-        </p:nvSpPr>
-        <p:spPr>
-          <a:xfrm>
-            <a:off x="569545" y="2261377"/>
-            <a:ext cx="389408" cy="565666"/>
-          </a:xfrm>
-          <a:prstGeom prst="flowChartProcess">
-            <a:avLst/>
-          </a:prstGeom>
-          <a:solidFill>
-            <a:schemeClr val="accent1"/>
-          </a:solidFill>
-          <a:ln>
-            <a:noFill/>
-          </a:ln>
-          <a:effectLst/>
-        </p:spPr>
-        <p:style>
-          <a:lnRef idx="1">
-            <a:schemeClr val="accent1"/>
-          </a:lnRef>
-          <a:fillRef idx="3">
-            <a:schemeClr val="accent1"/>
-          </a:fillRef>
-          <a:effectRef idx="2">
-            <a:schemeClr val="accent1"/>
-          </a:effectRef>
-          <a:fontRef idx="minor">
-            <a:schemeClr val="lt1"/>
-          </a:fontRef>
-        </p:style>
-        <p:txBody>
-          <a:bodyPr lIns="0" tIns="0" rIns="0" bIns="0" rtlCol="0" anchor="ctr"/>
-          <a:lstStyle/>
-          <a:p>
-            <a:pPr algn="ctr"/>
-            <a:r>
-              <a:rPr lang="en-US" dirty="0"/>
-              <a:t>0</a:t>
-            </a:r>
-          </a:p>
-        </p:txBody>
-      </p:sp>
-      <p:sp>
-        <p:nvSpPr>
-          <p:cNvPr id="52" name="Flowchart: Process 51">
-            <a:extLst>
-              <a:ext uri="{FF2B5EF4-FFF2-40B4-BE49-F238E27FC236}">
-                <a16:creationId xmlns:a16="http://schemas.microsoft.com/office/drawing/2014/main" id="{6C67D2C1-DDE9-F01B-1D59-F8463CE1C1AF}"/>
-              </a:ext>
-            </a:extLst>
-          </p:cNvPr>
-          <p:cNvSpPr/>
-          <p:nvPr/>
-        </p:nvSpPr>
-        <p:spPr>
-          <a:xfrm>
-            <a:off x="1121339" y="2271492"/>
-            <a:ext cx="389408" cy="565666"/>
-          </a:xfrm>
-          <a:prstGeom prst="flowChartProcess">
-            <a:avLst/>
-          </a:prstGeom>
-          <a:solidFill>
-            <a:schemeClr val="accent1"/>
-          </a:solidFill>
-          <a:ln>
-            <a:noFill/>
-          </a:ln>
-          <a:effectLst/>
-        </p:spPr>
-        <p:style>
-          <a:lnRef idx="1">
-            <a:schemeClr val="accent1"/>
-          </a:lnRef>
-          <a:fillRef idx="3">
-            <a:schemeClr val="accent1"/>
-          </a:fillRef>
-          <a:effectRef idx="2">
-            <a:schemeClr val="accent1"/>
-          </a:effectRef>
-          <a:fontRef idx="minor">
-            <a:schemeClr val="lt1"/>
-          </a:fontRef>
-        </p:style>
-        <p:txBody>
-          <a:bodyPr lIns="0" tIns="0" rIns="0" bIns="0" rtlCol="0" anchor="ctr"/>
-          <a:lstStyle/>
-          <a:p>
-            <a:pPr algn="ctr"/>
-            <a:r>
-              <a:rPr lang="en-US" dirty="0"/>
-              <a:t>1</a:t>
-            </a:r>
-          </a:p>
-        </p:txBody>
-      </p:sp>
-      <p:sp>
-        <p:nvSpPr>
-          <p:cNvPr id="53" name="Flowchart: Process 52">
-            <a:extLst>
-              <a:ext uri="{FF2B5EF4-FFF2-40B4-BE49-F238E27FC236}">
-                <a16:creationId xmlns:a16="http://schemas.microsoft.com/office/drawing/2014/main" id="{8A8B9020-A32F-ED3E-970A-BE70EAB12E13}"/>
-              </a:ext>
-            </a:extLst>
-          </p:cNvPr>
-          <p:cNvSpPr/>
-          <p:nvPr/>
-        </p:nvSpPr>
-        <p:spPr>
-          <a:xfrm>
-            <a:off x="1673133" y="2271492"/>
-            <a:ext cx="389408" cy="565666"/>
-          </a:xfrm>
-          <a:prstGeom prst="flowChartProcess">
-            <a:avLst/>
-          </a:prstGeom>
-          <a:solidFill>
-            <a:schemeClr val="accent1"/>
-          </a:solidFill>
-          <a:ln>
-            <a:noFill/>
-          </a:ln>
-          <a:effectLst/>
-        </p:spPr>
-        <p:style>
-          <a:lnRef idx="1">
-            <a:schemeClr val="accent1"/>
-          </a:lnRef>
-          <a:fillRef idx="3">
-            <a:schemeClr val="accent1"/>
-          </a:fillRef>
-          <a:effectRef idx="2">
-            <a:schemeClr val="accent1"/>
-          </a:effectRef>
-          <a:fontRef idx="minor">
-            <a:schemeClr val="lt1"/>
-          </a:fontRef>
-        </p:style>
-        <p:txBody>
-          <a:bodyPr lIns="0" tIns="0" rIns="0" bIns="0" rtlCol="0" anchor="ctr"/>
-          <a:lstStyle/>
-          <a:p>
-            <a:pPr algn="ctr"/>
-            <a:r>
-              <a:rPr lang="en-US" dirty="0"/>
-              <a:t>2</a:t>
-            </a:r>
-          </a:p>
-        </p:txBody>
-      </p:sp>
-      <p:sp>
-        <p:nvSpPr>
-          <p:cNvPr id="54" name="Flowchart: Process 53">
-            <a:extLst>
-              <a:ext uri="{FF2B5EF4-FFF2-40B4-BE49-F238E27FC236}">
-                <a16:creationId xmlns:a16="http://schemas.microsoft.com/office/drawing/2014/main" id="{8B56102B-B4FB-DB32-E770-0C56DF46AC89}"/>
-              </a:ext>
-            </a:extLst>
-          </p:cNvPr>
-          <p:cNvSpPr/>
-          <p:nvPr/>
-        </p:nvSpPr>
-        <p:spPr>
-          <a:xfrm>
-            <a:off x="2224927" y="2278908"/>
-            <a:ext cx="389408" cy="565666"/>
-          </a:xfrm>
-          <a:prstGeom prst="flowChartProcess">
-            <a:avLst/>
-          </a:prstGeom>
-          <a:solidFill>
-            <a:schemeClr val="accent1"/>
-          </a:solidFill>
-          <a:ln>
-            <a:noFill/>
-          </a:ln>
-          <a:effectLst/>
-        </p:spPr>
-        <p:style>
-          <a:lnRef idx="1">
-            <a:schemeClr val="accent1"/>
-          </a:lnRef>
-          <a:fillRef idx="3">
-            <a:schemeClr val="accent1"/>
-          </a:fillRef>
-          <a:effectRef idx="2">
-            <a:schemeClr val="accent1"/>
-          </a:effectRef>
-          <a:fontRef idx="minor">
-            <a:schemeClr val="lt1"/>
-          </a:fontRef>
-        </p:style>
-        <p:txBody>
-          <a:bodyPr lIns="0" tIns="0" rIns="0" bIns="0" rtlCol="0" anchor="ctr"/>
-          <a:lstStyle/>
-          <a:p>
-            <a:pPr algn="ctr"/>
-            <a:r>
-              <a:rPr lang="en-US" dirty="0"/>
-              <a:t>3</a:t>
-            </a:r>
-          </a:p>
-        </p:txBody>
-      </p:sp>
-      <p:sp>
-        <p:nvSpPr>
-          <p:cNvPr id="55" name="Flowchart: Process 54">
-            <a:extLst>
-              <a:ext uri="{FF2B5EF4-FFF2-40B4-BE49-F238E27FC236}">
-                <a16:creationId xmlns:a16="http://schemas.microsoft.com/office/drawing/2014/main" id="{D6174FFF-298B-E8CB-6FE5-7AE221380CC9}"/>
-              </a:ext>
-            </a:extLst>
-          </p:cNvPr>
-          <p:cNvSpPr/>
-          <p:nvPr/>
-        </p:nvSpPr>
-        <p:spPr>
-          <a:xfrm>
-            <a:off x="2776721" y="2278908"/>
-            <a:ext cx="389408" cy="565666"/>
-          </a:xfrm>
-          <a:prstGeom prst="flowChartProcess">
-            <a:avLst/>
-          </a:prstGeom>
-          <a:solidFill>
-            <a:schemeClr val="accent1"/>
-          </a:solidFill>
-          <a:ln>
-            <a:noFill/>
-          </a:ln>
-          <a:effectLst/>
-        </p:spPr>
-        <p:style>
-          <a:lnRef idx="1">
-            <a:schemeClr val="accent1"/>
-          </a:lnRef>
-          <a:fillRef idx="3">
-            <a:schemeClr val="accent1"/>
-          </a:fillRef>
-          <a:effectRef idx="2">
-            <a:schemeClr val="accent1"/>
-          </a:effectRef>
-          <a:fontRef idx="minor">
-            <a:schemeClr val="lt1"/>
-          </a:fontRef>
-        </p:style>
-        <p:txBody>
-          <a:bodyPr lIns="0" tIns="0" rIns="0" bIns="0" rtlCol="0" anchor="ctr"/>
-          <a:lstStyle/>
-          <a:p>
-            <a:pPr algn="ctr"/>
-            <a:r>
-              <a:rPr lang="en-US" dirty="0"/>
-              <a:t>4</a:t>
-            </a:r>
-          </a:p>
-        </p:txBody>
-      </p:sp>
-      <p:sp>
-        <p:nvSpPr>
-          <p:cNvPr id="56" name="Flowchart: Process 55">
-            <a:extLst>
-              <a:ext uri="{FF2B5EF4-FFF2-40B4-BE49-F238E27FC236}">
-                <a16:creationId xmlns:a16="http://schemas.microsoft.com/office/drawing/2014/main" id="{DCBD5F8A-1FC7-390E-F87D-1F6CEE60E103}"/>
-              </a:ext>
-            </a:extLst>
-          </p:cNvPr>
-          <p:cNvSpPr/>
-          <p:nvPr/>
-        </p:nvSpPr>
-        <p:spPr>
-          <a:xfrm>
-            <a:off x="3328515" y="2278908"/>
-            <a:ext cx="389408" cy="565666"/>
-          </a:xfrm>
-          <a:prstGeom prst="flowChartProcess">
-            <a:avLst/>
-          </a:prstGeom>
-          <a:solidFill>
-            <a:schemeClr val="accent1"/>
-          </a:solidFill>
-          <a:ln>
-            <a:noFill/>
-          </a:ln>
-          <a:effectLst/>
-        </p:spPr>
-        <p:style>
-          <a:lnRef idx="1">
-            <a:schemeClr val="accent1"/>
-          </a:lnRef>
-          <a:fillRef idx="3">
-            <a:schemeClr val="accent1"/>
-          </a:fillRef>
-          <a:effectRef idx="2">
-            <a:schemeClr val="accent1"/>
-          </a:effectRef>
-          <a:fontRef idx="minor">
-            <a:schemeClr val="lt1"/>
-          </a:fontRef>
-        </p:style>
-        <p:txBody>
-          <a:bodyPr lIns="0" tIns="0" rIns="0" bIns="0" rtlCol="0" anchor="ctr"/>
-          <a:lstStyle/>
-          <a:p>
-            <a:pPr algn="ctr"/>
-            <a:r>
-              <a:rPr lang="en-US" dirty="0"/>
-              <a:t>5</a:t>
-            </a:r>
-          </a:p>
-        </p:txBody>
-      </p:sp>
-      <p:sp>
-        <p:nvSpPr>
-          <p:cNvPr id="57" name="Flowchart: Process 56">
-            <a:extLst>
-              <a:ext uri="{FF2B5EF4-FFF2-40B4-BE49-F238E27FC236}">
-                <a16:creationId xmlns:a16="http://schemas.microsoft.com/office/drawing/2014/main" id="{D5A2020F-830C-FE9A-6EDF-D0AEF7A07CDE}"/>
-              </a:ext>
-            </a:extLst>
-          </p:cNvPr>
-          <p:cNvSpPr/>
-          <p:nvPr/>
-        </p:nvSpPr>
-        <p:spPr>
-          <a:xfrm>
-            <a:off x="3880309" y="2278908"/>
-            <a:ext cx="389408" cy="565666"/>
-          </a:xfrm>
-          <a:prstGeom prst="flowChartProcess">
-            <a:avLst/>
-          </a:prstGeom>
-          <a:solidFill>
-            <a:schemeClr val="accent1"/>
-          </a:solidFill>
-          <a:ln>
-            <a:noFill/>
-          </a:ln>
-          <a:effectLst/>
-        </p:spPr>
-        <p:style>
-          <a:lnRef idx="1">
-            <a:schemeClr val="accent1"/>
-          </a:lnRef>
-          <a:fillRef idx="3">
-            <a:schemeClr val="accent1"/>
-          </a:fillRef>
-          <a:effectRef idx="2">
-            <a:schemeClr val="accent1"/>
-          </a:effectRef>
-          <a:fontRef idx="minor">
-            <a:schemeClr val="lt1"/>
-          </a:fontRef>
-        </p:style>
-        <p:txBody>
-          <a:bodyPr lIns="0" tIns="0" rIns="0" bIns="0" rtlCol="0" anchor="ctr"/>
-          <a:lstStyle/>
-          <a:p>
-            <a:pPr algn="ctr"/>
-            <a:r>
-              <a:rPr lang="en-US" dirty="0"/>
-              <a:t>6</a:t>
-            </a:r>
-          </a:p>
-        </p:txBody>
-      </p:sp>
-      <p:sp>
-        <p:nvSpPr>
-          <p:cNvPr id="58" name="Flowchart: Process 57">
-            <a:extLst>
-              <a:ext uri="{FF2B5EF4-FFF2-40B4-BE49-F238E27FC236}">
-                <a16:creationId xmlns:a16="http://schemas.microsoft.com/office/drawing/2014/main" id="{88431404-4318-46B6-A598-56ECC29CE389}"/>
-              </a:ext>
-            </a:extLst>
-          </p:cNvPr>
-          <p:cNvSpPr/>
-          <p:nvPr/>
-        </p:nvSpPr>
-        <p:spPr>
-          <a:xfrm>
-            <a:off x="4432103" y="2271492"/>
-            <a:ext cx="389408" cy="565666"/>
-          </a:xfrm>
-          <a:prstGeom prst="flowChartProcess">
-            <a:avLst/>
-          </a:prstGeom>
-          <a:solidFill>
-            <a:schemeClr val="accent1"/>
-          </a:solidFill>
-          <a:ln>
-            <a:noFill/>
-          </a:ln>
-          <a:effectLst/>
-        </p:spPr>
-        <p:style>
-          <a:lnRef idx="1">
-            <a:schemeClr val="accent1"/>
-          </a:lnRef>
-          <a:fillRef idx="3">
-            <a:schemeClr val="accent1"/>
-          </a:fillRef>
-          <a:effectRef idx="2">
-            <a:schemeClr val="accent1"/>
-          </a:effectRef>
-          <a:fontRef idx="minor">
-            <a:schemeClr val="lt1"/>
-          </a:fontRef>
-        </p:style>
-        <p:txBody>
-          <a:bodyPr lIns="0" tIns="0" rIns="0" bIns="0" rtlCol="0" anchor="ctr"/>
-          <a:lstStyle/>
-          <a:p>
-            <a:pPr algn="ctr"/>
-            <a:r>
-              <a:rPr lang="en-US" dirty="0"/>
-              <a:t>7</a:t>
-            </a:r>
-          </a:p>
-        </p:txBody>
-      </p:sp>
-      <p:sp>
-        <p:nvSpPr>
-          <p:cNvPr id="59" name="Flowchart: Process 58">
-            <a:extLst>
-              <a:ext uri="{FF2B5EF4-FFF2-40B4-BE49-F238E27FC236}">
-                <a16:creationId xmlns:a16="http://schemas.microsoft.com/office/drawing/2014/main" id="{FDD0920B-A539-9641-67BA-D3FC588E263C}"/>
-              </a:ext>
-            </a:extLst>
-          </p:cNvPr>
-          <p:cNvSpPr/>
-          <p:nvPr/>
-        </p:nvSpPr>
-        <p:spPr>
-          <a:xfrm>
-            <a:off x="4987296" y="2271492"/>
-            <a:ext cx="389408" cy="565666"/>
-          </a:xfrm>
-          <a:prstGeom prst="flowChartProcess">
-            <a:avLst/>
-          </a:prstGeom>
-          <a:solidFill>
-            <a:schemeClr val="accent1"/>
-          </a:solidFill>
-          <a:ln>
-            <a:noFill/>
-          </a:ln>
-          <a:effectLst/>
-        </p:spPr>
-        <p:style>
-          <a:lnRef idx="1">
-            <a:schemeClr val="accent1"/>
-          </a:lnRef>
-          <a:fillRef idx="3">
-            <a:schemeClr val="accent1"/>
-          </a:fillRef>
-          <a:effectRef idx="2">
-            <a:schemeClr val="accent1"/>
-          </a:effectRef>
-          <a:fontRef idx="minor">
-            <a:schemeClr val="lt1"/>
-          </a:fontRef>
-        </p:style>
-        <p:txBody>
-          <a:bodyPr lIns="0" tIns="0" rIns="0" bIns="0" rtlCol="0" anchor="ctr"/>
-          <a:lstStyle/>
-          <a:p>
-            <a:pPr algn="ctr"/>
-            <a:r>
-              <a:rPr lang="en-US" dirty="0"/>
-              <a:t>8</a:t>
-            </a:r>
-          </a:p>
-        </p:txBody>
-      </p:sp>
-      <p:sp>
-        <p:nvSpPr>
-          <p:cNvPr id="60" name="Flowchart: Process 59">
-            <a:extLst>
-              <a:ext uri="{FF2B5EF4-FFF2-40B4-BE49-F238E27FC236}">
-                <a16:creationId xmlns:a16="http://schemas.microsoft.com/office/drawing/2014/main" id="{1ED68F09-3CE8-5146-A8FB-681D6CC233DC}"/>
-              </a:ext>
-            </a:extLst>
-          </p:cNvPr>
-          <p:cNvSpPr/>
-          <p:nvPr/>
-        </p:nvSpPr>
-        <p:spPr>
-          <a:xfrm>
-            <a:off x="5542489" y="2271492"/>
-            <a:ext cx="389408" cy="565666"/>
-          </a:xfrm>
-          <a:prstGeom prst="flowChartProcess">
-            <a:avLst/>
-          </a:prstGeom>
-          <a:solidFill>
-            <a:schemeClr val="accent1"/>
-          </a:solidFill>
-          <a:ln>
-            <a:noFill/>
-          </a:ln>
-          <a:effectLst/>
-        </p:spPr>
-        <p:style>
-          <a:lnRef idx="1">
-            <a:schemeClr val="accent1"/>
-          </a:lnRef>
-          <a:fillRef idx="3">
-            <a:schemeClr val="accent1"/>
-          </a:fillRef>
-          <a:effectRef idx="2">
-            <a:schemeClr val="accent1"/>
-          </a:effectRef>
-          <a:fontRef idx="minor">
-            <a:schemeClr val="lt1"/>
-          </a:fontRef>
-        </p:style>
-        <p:txBody>
-          <a:bodyPr lIns="0" tIns="0" rIns="0" bIns="0" rtlCol="0" anchor="ctr"/>
-          <a:lstStyle/>
-          <a:p>
-            <a:pPr algn="ctr"/>
-            <a:r>
-              <a:rPr lang="en-US" dirty="0"/>
-              <a:t>9</a:t>
-            </a:r>
-          </a:p>
-        </p:txBody>
-      </p:sp>
-      <p:sp>
-        <p:nvSpPr>
-          <p:cNvPr id="61" name="Flowchart: Process 60">
-            <a:extLst>
-              <a:ext uri="{FF2B5EF4-FFF2-40B4-BE49-F238E27FC236}">
-                <a16:creationId xmlns:a16="http://schemas.microsoft.com/office/drawing/2014/main" id="{EEBBC4D7-31C5-F085-F0E8-E9C3E754DBEC}"/>
-              </a:ext>
-            </a:extLst>
-          </p:cNvPr>
-          <p:cNvSpPr/>
-          <p:nvPr/>
-        </p:nvSpPr>
-        <p:spPr>
-          <a:xfrm>
-            <a:off x="6090884" y="2271492"/>
-            <a:ext cx="389408" cy="565666"/>
-          </a:xfrm>
-          <a:prstGeom prst="flowChartProcess">
-            <a:avLst/>
-          </a:prstGeom>
-          <a:solidFill>
-            <a:schemeClr val="accent1"/>
-          </a:solidFill>
-          <a:ln>
-            <a:noFill/>
-          </a:ln>
-          <a:effectLst/>
-        </p:spPr>
-        <p:style>
-          <a:lnRef idx="1">
-            <a:schemeClr val="accent1"/>
-          </a:lnRef>
-          <a:fillRef idx="3">
-            <a:schemeClr val="accent1"/>
-          </a:fillRef>
-          <a:effectRef idx="2">
-            <a:schemeClr val="accent1"/>
-          </a:effectRef>
-          <a:fontRef idx="minor">
-            <a:schemeClr val="lt1"/>
-          </a:fontRef>
-        </p:style>
-        <p:txBody>
-          <a:bodyPr lIns="0" tIns="0" rIns="0" bIns="0" rtlCol="0" anchor="ctr"/>
-          <a:lstStyle/>
-          <a:p>
-            <a:pPr algn="ctr"/>
-            <a:r>
-              <a:rPr lang="en-US" dirty="0"/>
-              <a:t>10</a:t>
-            </a:r>
-          </a:p>
-        </p:txBody>
-      </p:sp>
-      <p:sp>
-        <p:nvSpPr>
-          <p:cNvPr id="62" name="Flowchart: Process 61">
-            <a:extLst>
-              <a:ext uri="{FF2B5EF4-FFF2-40B4-BE49-F238E27FC236}">
-                <a16:creationId xmlns:a16="http://schemas.microsoft.com/office/drawing/2014/main" id="{35435DCD-B3AF-1A20-3253-C082E38FAF00}"/>
-              </a:ext>
-            </a:extLst>
-          </p:cNvPr>
-          <p:cNvSpPr/>
-          <p:nvPr/>
-        </p:nvSpPr>
-        <p:spPr>
-          <a:xfrm>
-            <a:off x="6639279" y="2261377"/>
-            <a:ext cx="389408" cy="565666"/>
-          </a:xfrm>
-          <a:prstGeom prst="flowChartProcess">
-            <a:avLst/>
-          </a:prstGeom>
-          <a:solidFill>
-            <a:schemeClr val="accent1"/>
-          </a:solidFill>
-          <a:ln>
-            <a:noFill/>
-          </a:ln>
-          <a:effectLst/>
-        </p:spPr>
-        <p:style>
-          <a:lnRef idx="1">
-            <a:schemeClr val="accent1"/>
-          </a:lnRef>
-          <a:fillRef idx="3">
-            <a:schemeClr val="accent1"/>
-          </a:fillRef>
-          <a:effectRef idx="2">
-            <a:schemeClr val="accent1"/>
-          </a:effectRef>
-          <a:fontRef idx="minor">
-            <a:schemeClr val="lt1"/>
-          </a:fontRef>
-        </p:style>
-        <p:txBody>
-          <a:bodyPr lIns="0" tIns="0" rIns="0" bIns="0" rtlCol="0" anchor="ctr"/>
-          <a:lstStyle/>
-          <a:p>
-            <a:pPr algn="ctr"/>
-            <a:r>
-              <a:rPr lang="en-US" dirty="0"/>
-              <a:t>11</a:t>
-            </a:r>
-          </a:p>
-        </p:txBody>
-      </p:sp>
-      <p:sp>
-        <p:nvSpPr>
-          <p:cNvPr id="63" name="Flowchart: Process 62">
-            <a:extLst>
-              <a:ext uri="{FF2B5EF4-FFF2-40B4-BE49-F238E27FC236}">
-                <a16:creationId xmlns:a16="http://schemas.microsoft.com/office/drawing/2014/main" id="{54F23100-135E-7CAE-0E70-5938BDAA77E3}"/>
-              </a:ext>
-            </a:extLst>
-          </p:cNvPr>
-          <p:cNvSpPr/>
-          <p:nvPr/>
-        </p:nvSpPr>
-        <p:spPr>
-          <a:xfrm>
-            <a:off x="7194472" y="2261377"/>
-            <a:ext cx="389408" cy="565666"/>
-          </a:xfrm>
-          <a:prstGeom prst="flowChartProcess">
-            <a:avLst/>
-          </a:prstGeom>
-          <a:solidFill>
-            <a:schemeClr val="accent1"/>
-          </a:solidFill>
-          <a:ln>
-            <a:noFill/>
-          </a:ln>
-          <a:effectLst/>
-        </p:spPr>
-        <p:style>
-          <a:lnRef idx="1">
-            <a:schemeClr val="accent1"/>
-          </a:lnRef>
-          <a:fillRef idx="3">
-            <a:schemeClr val="accent1"/>
-          </a:fillRef>
-          <a:effectRef idx="2">
-            <a:schemeClr val="accent1"/>
-          </a:effectRef>
-          <a:fontRef idx="minor">
-            <a:schemeClr val="lt1"/>
-          </a:fontRef>
-        </p:style>
-        <p:txBody>
-          <a:bodyPr lIns="0" tIns="0" rIns="0" bIns="0" rtlCol="0" anchor="ctr"/>
-          <a:lstStyle/>
-          <a:p>
-            <a:pPr algn="ctr"/>
-            <a:r>
-              <a:rPr lang="en-US" dirty="0"/>
-              <a:t>12</a:t>
-            </a:r>
-          </a:p>
-        </p:txBody>
-      </p:sp>
-      <p:sp>
-        <p:nvSpPr>
-          <p:cNvPr id="64" name="Flowchart: Process 63">
-            <a:extLst>
-              <a:ext uri="{FF2B5EF4-FFF2-40B4-BE49-F238E27FC236}">
-                <a16:creationId xmlns:a16="http://schemas.microsoft.com/office/drawing/2014/main" id="{4A746600-0081-400D-DACE-0A4ACC7899E7}"/>
-              </a:ext>
-            </a:extLst>
-          </p:cNvPr>
-          <p:cNvSpPr/>
-          <p:nvPr/>
-        </p:nvSpPr>
-        <p:spPr>
-          <a:xfrm>
-            <a:off x="7742867" y="2261377"/>
-            <a:ext cx="389408" cy="565666"/>
-          </a:xfrm>
-          <a:prstGeom prst="flowChartProcess">
-            <a:avLst/>
-          </a:prstGeom>
-          <a:solidFill>
-            <a:schemeClr val="accent1"/>
-          </a:solidFill>
-          <a:ln>
-            <a:noFill/>
-          </a:ln>
-          <a:effectLst/>
-        </p:spPr>
-        <p:style>
-          <a:lnRef idx="1">
-            <a:schemeClr val="accent1"/>
-          </a:lnRef>
-          <a:fillRef idx="3">
-            <a:schemeClr val="accent1"/>
-          </a:fillRef>
-          <a:effectRef idx="2">
-            <a:schemeClr val="accent1"/>
-          </a:effectRef>
-          <a:fontRef idx="minor">
-            <a:schemeClr val="lt1"/>
-          </a:fontRef>
-        </p:style>
-        <p:txBody>
-          <a:bodyPr lIns="0" tIns="0" rIns="0" bIns="0" rtlCol="0" anchor="ctr"/>
-          <a:lstStyle/>
-          <a:p>
-            <a:pPr algn="ctr"/>
-            <a:r>
-              <a:rPr lang="en-US" dirty="0"/>
-              <a:t>13</a:t>
-            </a:r>
-          </a:p>
-        </p:txBody>
-      </p:sp>
-      <p:sp>
-        <p:nvSpPr>
-          <p:cNvPr id="65" name="Flowchart: Process 64">
-            <a:extLst>
-              <a:ext uri="{FF2B5EF4-FFF2-40B4-BE49-F238E27FC236}">
-                <a16:creationId xmlns:a16="http://schemas.microsoft.com/office/drawing/2014/main" id="{78578E80-C396-1B39-2FDC-B6D4E48D73B3}"/>
-              </a:ext>
-            </a:extLst>
-          </p:cNvPr>
-          <p:cNvSpPr/>
-          <p:nvPr/>
-        </p:nvSpPr>
-        <p:spPr>
-          <a:xfrm>
-            <a:off x="8304186" y="2261377"/>
-            <a:ext cx="389408" cy="565666"/>
-          </a:xfrm>
-          <a:prstGeom prst="flowChartProcess">
-            <a:avLst/>
-          </a:prstGeom>
-          <a:solidFill>
-            <a:schemeClr val="accent1"/>
-          </a:solidFill>
-          <a:ln>
-            <a:noFill/>
-          </a:ln>
-          <a:effectLst/>
-        </p:spPr>
-        <p:style>
-          <a:lnRef idx="1">
-            <a:schemeClr val="accent1"/>
-          </a:lnRef>
-          <a:fillRef idx="3">
-            <a:schemeClr val="accent1"/>
-          </a:fillRef>
-          <a:effectRef idx="2">
-            <a:schemeClr val="accent1"/>
-          </a:effectRef>
-          <a:fontRef idx="minor">
-            <a:schemeClr val="lt1"/>
-          </a:fontRef>
-        </p:style>
-        <p:txBody>
-          <a:bodyPr lIns="0" tIns="0" rIns="0" bIns="0" rtlCol="0" anchor="ctr"/>
-          <a:lstStyle/>
-          <a:p>
-            <a:pPr algn="ctr"/>
-            <a:r>
-              <a:rPr lang="en-US" dirty="0"/>
-              <a:t>14</a:t>
-            </a:r>
-          </a:p>
-        </p:txBody>
-      </p:sp>
-      <p:sp>
-        <p:nvSpPr>
-          <p:cNvPr id="66" name="Flowchart: Process 65">
-            <a:extLst>
-              <a:ext uri="{FF2B5EF4-FFF2-40B4-BE49-F238E27FC236}">
-                <a16:creationId xmlns:a16="http://schemas.microsoft.com/office/drawing/2014/main" id="{57ADB779-368F-D582-8A61-1490DB2AA6DA}"/>
-              </a:ext>
-            </a:extLst>
-          </p:cNvPr>
-          <p:cNvSpPr/>
-          <p:nvPr/>
-        </p:nvSpPr>
-        <p:spPr>
-          <a:xfrm>
-            <a:off x="8865505" y="2261377"/>
-            <a:ext cx="389408" cy="565666"/>
-          </a:xfrm>
-          <a:prstGeom prst="flowChartProcess">
-            <a:avLst/>
-          </a:prstGeom>
-          <a:solidFill>
-            <a:schemeClr val="accent1"/>
-          </a:solidFill>
-          <a:ln>
-            <a:noFill/>
-          </a:ln>
-          <a:effectLst/>
-        </p:spPr>
-        <p:style>
-          <a:lnRef idx="1">
-            <a:schemeClr val="accent1"/>
-          </a:lnRef>
-          <a:fillRef idx="3">
-            <a:schemeClr val="accent1"/>
-          </a:fillRef>
-          <a:effectRef idx="2">
-            <a:schemeClr val="accent1"/>
-          </a:effectRef>
-          <a:fontRef idx="minor">
-            <a:schemeClr val="lt1"/>
-          </a:fontRef>
-        </p:style>
-        <p:txBody>
-          <a:bodyPr lIns="0" tIns="0" rIns="0" bIns="0" rtlCol="0" anchor="ctr"/>
-          <a:lstStyle/>
-          <a:p>
-            <a:pPr algn="ctr"/>
-            <a:r>
-              <a:rPr lang="en-US" dirty="0"/>
-              <a:t>15</a:t>
-            </a:r>
-          </a:p>
-        </p:txBody>
-      </p:sp>
-      <p:sp>
-        <p:nvSpPr>
-          <p:cNvPr id="67" name="Flowchart: Process 66">
-            <a:extLst>
-              <a:ext uri="{FF2B5EF4-FFF2-40B4-BE49-F238E27FC236}">
-                <a16:creationId xmlns:a16="http://schemas.microsoft.com/office/drawing/2014/main" id="{E038E7C0-9CF1-9A06-AD47-FD07BA3D5CBF}"/>
-              </a:ext>
-            </a:extLst>
-          </p:cNvPr>
-          <p:cNvSpPr/>
-          <p:nvPr/>
-        </p:nvSpPr>
-        <p:spPr>
-          <a:xfrm>
-            <a:off x="9411173" y="2261377"/>
-            <a:ext cx="389408" cy="565666"/>
-          </a:xfrm>
-          <a:prstGeom prst="flowChartProcess">
-            <a:avLst/>
-          </a:prstGeom>
-          <a:solidFill>
-            <a:schemeClr val="accent1"/>
-          </a:solidFill>
-          <a:ln>
-            <a:noFill/>
-          </a:ln>
-          <a:effectLst/>
-        </p:spPr>
-        <p:style>
-          <a:lnRef idx="1">
-            <a:schemeClr val="accent1"/>
-          </a:lnRef>
-          <a:fillRef idx="3">
-            <a:schemeClr val="accent1"/>
-          </a:fillRef>
-          <a:effectRef idx="2">
-            <a:schemeClr val="accent1"/>
-          </a:effectRef>
-          <a:fontRef idx="minor">
-            <a:schemeClr val="lt1"/>
-          </a:fontRef>
-        </p:style>
-        <p:txBody>
-          <a:bodyPr lIns="0" tIns="0" rIns="0" bIns="0" rtlCol="0" anchor="ctr"/>
-          <a:lstStyle/>
-          <a:p>
-            <a:pPr algn="ctr"/>
-            <a:r>
-              <a:rPr lang="en-US" dirty="0"/>
-              <a:t>16</a:t>
-            </a:r>
-          </a:p>
-        </p:txBody>
-      </p:sp>
-      <p:sp>
-        <p:nvSpPr>
-          <p:cNvPr id="68" name="Flowchart: Process 67">
-            <a:extLst>
-              <a:ext uri="{FF2B5EF4-FFF2-40B4-BE49-F238E27FC236}">
-                <a16:creationId xmlns:a16="http://schemas.microsoft.com/office/drawing/2014/main" id="{5C66AFEF-8E3D-893A-9B3D-D53D70D8826D}"/>
-              </a:ext>
-            </a:extLst>
-          </p:cNvPr>
-          <p:cNvSpPr/>
-          <p:nvPr/>
-        </p:nvSpPr>
-        <p:spPr>
-          <a:xfrm>
-            <a:off x="9960240" y="2261377"/>
-            <a:ext cx="389408" cy="565666"/>
-          </a:xfrm>
-          <a:prstGeom prst="flowChartProcess">
-            <a:avLst/>
-          </a:prstGeom>
-          <a:solidFill>
-            <a:schemeClr val="accent1"/>
-          </a:solidFill>
-          <a:ln>
-            <a:noFill/>
-          </a:ln>
-          <a:effectLst/>
-        </p:spPr>
-        <p:style>
-          <a:lnRef idx="1">
-            <a:schemeClr val="accent1"/>
-          </a:lnRef>
-          <a:fillRef idx="3">
-            <a:schemeClr val="accent1"/>
-          </a:fillRef>
-          <a:effectRef idx="2">
-            <a:schemeClr val="accent1"/>
-          </a:effectRef>
-          <a:fontRef idx="minor">
-            <a:schemeClr val="lt1"/>
-          </a:fontRef>
-        </p:style>
-        <p:txBody>
-          <a:bodyPr lIns="0" tIns="0" rIns="0" bIns="0" rtlCol="0" anchor="ctr"/>
-          <a:lstStyle/>
-          <a:p>
-            <a:pPr algn="ctr"/>
-            <a:r>
-              <a:rPr lang="en-US" dirty="0"/>
-              <a:t>17</a:t>
-            </a:r>
-          </a:p>
-        </p:txBody>
-      </p:sp>
-      <p:sp>
-        <p:nvSpPr>
-          <p:cNvPr id="69" name="Flowchart: Process 68">
-            <a:extLst>
-              <a:ext uri="{FF2B5EF4-FFF2-40B4-BE49-F238E27FC236}">
-                <a16:creationId xmlns:a16="http://schemas.microsoft.com/office/drawing/2014/main" id="{A19F3468-A095-BD83-A583-4B53A5CE8345}"/>
-              </a:ext>
-            </a:extLst>
-          </p:cNvPr>
-          <p:cNvSpPr/>
-          <p:nvPr/>
-        </p:nvSpPr>
-        <p:spPr>
-          <a:xfrm>
-            <a:off x="10512034" y="2261377"/>
-            <a:ext cx="389408" cy="565666"/>
-          </a:xfrm>
-          <a:prstGeom prst="flowChartProcess">
-            <a:avLst/>
-          </a:prstGeom>
-          <a:solidFill>
-            <a:schemeClr val="accent1"/>
-          </a:solidFill>
-          <a:ln>
-            <a:noFill/>
-          </a:ln>
-          <a:effectLst/>
-        </p:spPr>
-        <p:style>
-          <a:lnRef idx="1">
-            <a:schemeClr val="accent1"/>
-          </a:lnRef>
-          <a:fillRef idx="3">
-            <a:schemeClr val="accent1"/>
-          </a:fillRef>
-          <a:effectRef idx="2">
-            <a:schemeClr val="accent1"/>
-          </a:effectRef>
-          <a:fontRef idx="minor">
-            <a:schemeClr val="lt1"/>
-          </a:fontRef>
-        </p:style>
-        <p:txBody>
-          <a:bodyPr lIns="0" tIns="0" rIns="0" bIns="0" rtlCol="0" anchor="ctr"/>
-          <a:lstStyle/>
-          <a:p>
-            <a:pPr algn="ctr"/>
-            <a:r>
-              <a:rPr lang="en-US" dirty="0"/>
-              <a:t>18</a:t>
-            </a:r>
-          </a:p>
-        </p:txBody>
-      </p:sp>
-      <p:sp>
-        <p:nvSpPr>
-          <p:cNvPr id="70" name="Flowchart: Process 69">
-            <a:extLst>
-              <a:ext uri="{FF2B5EF4-FFF2-40B4-BE49-F238E27FC236}">
-                <a16:creationId xmlns:a16="http://schemas.microsoft.com/office/drawing/2014/main" id="{75FFB225-9A4B-08C3-433E-6AF8211991B2}"/>
-              </a:ext>
-            </a:extLst>
-          </p:cNvPr>
-          <p:cNvSpPr/>
-          <p:nvPr/>
-        </p:nvSpPr>
-        <p:spPr>
-          <a:xfrm>
-            <a:off x="11063828" y="2261377"/>
-            <a:ext cx="389408" cy="565666"/>
-          </a:xfrm>
-          <a:prstGeom prst="flowChartProcess">
-            <a:avLst/>
-          </a:prstGeom>
-          <a:solidFill>
-            <a:schemeClr val="accent1"/>
-          </a:solidFill>
-          <a:ln>
-            <a:noFill/>
-          </a:ln>
-          <a:effectLst/>
-        </p:spPr>
-        <p:style>
-          <a:lnRef idx="1">
-            <a:schemeClr val="accent1"/>
-          </a:lnRef>
-          <a:fillRef idx="3">
-            <a:schemeClr val="accent1"/>
-          </a:fillRef>
-          <a:effectRef idx="2">
-            <a:schemeClr val="accent1"/>
-          </a:effectRef>
-          <a:fontRef idx="minor">
-            <a:schemeClr val="lt1"/>
-          </a:fontRef>
-        </p:style>
-        <p:txBody>
-          <a:bodyPr lIns="0" tIns="0" rIns="0" bIns="0" rtlCol="0" anchor="ctr"/>
-          <a:lstStyle/>
-          <a:p>
-            <a:pPr algn="ctr"/>
-            <a:r>
-              <a:rPr lang="en-US" dirty="0"/>
-              <a:t>19</a:t>
-            </a:r>
-          </a:p>
-        </p:txBody>
-      </p:sp>
-      <p:sp>
-        <p:nvSpPr>
-          <p:cNvPr id="71" name="Flowchart: Process 70">
-            <a:extLst>
-              <a:ext uri="{FF2B5EF4-FFF2-40B4-BE49-F238E27FC236}">
-                <a16:creationId xmlns:a16="http://schemas.microsoft.com/office/drawing/2014/main" id="{A5DD0753-A95A-B571-60E3-34D4DF7FF45C}"/>
-              </a:ext>
-            </a:extLst>
-          </p:cNvPr>
-          <p:cNvSpPr/>
-          <p:nvPr/>
-        </p:nvSpPr>
-        <p:spPr>
-          <a:xfrm>
-            <a:off x="1196157" y="2379005"/>
-            <a:ext cx="221114" cy="363076"/>
-          </a:xfrm>
-          <a:prstGeom prst="flowChartProcess">
-            <a:avLst/>
-          </a:prstGeom>
-          <a:noFill/>
-          <a:ln w="9525" cap="flat" cmpd="sng" algn="ctr">
-            <a:solidFill>
-              <a:schemeClr val="bg1"/>
-            </a:solidFill>
-            <a:prstDash val="solid"/>
-            <a:round/>
-            <a:headEnd type="none" w="med" len="med"/>
-            <a:tailEnd type="none" w="med" len="med"/>
-          </a:ln>
-        </p:spPr>
-        <p:style>
-          <a:lnRef idx="0">
-            <a:scrgbClr r="0" g="0" b="0"/>
-          </a:lnRef>
-          <a:fillRef idx="0">
-            <a:scrgbClr r="0" g="0" b="0"/>
-          </a:fillRef>
-          <a:effectRef idx="0">
-            <a:scrgbClr r="0" g="0" b="0"/>
-          </a:effectRef>
-          <a:fontRef idx="minor">
-            <a:schemeClr val="accent5"/>
-          </a:fontRef>
-        </p:style>
-        <p:txBody>
-          <a:bodyPr rtlCol="0" anchor="ctr"/>
-          <a:lstStyle/>
-          <a:p>
-            <a:pPr algn="ctr"/>
-            <a:endParaRPr lang="en-US"/>
-          </a:p>
-        </p:txBody>
-      </p:sp>
-      <p:cxnSp>
-        <p:nvCxnSpPr>
-          <p:cNvPr id="44" name="Straight Arrow Connector 43">
-            <a:extLst>
-              <a:ext uri="{FF2B5EF4-FFF2-40B4-BE49-F238E27FC236}">
-                <a16:creationId xmlns:a16="http://schemas.microsoft.com/office/drawing/2014/main" id="{C20B1818-D227-314B-09BD-60EECB36A4E7}"/>
-              </a:ext>
-            </a:extLst>
-          </p:cNvPr>
-          <p:cNvCxnSpPr>
-            <a:cxnSpLocks/>
-          </p:cNvCxnSpPr>
-          <p:nvPr/>
-        </p:nvCxnSpPr>
-        <p:spPr>
-          <a:xfrm>
-            <a:off x="1355287" y="2725890"/>
-            <a:ext cx="700456" cy="398310"/>
-          </a:xfrm>
-          <a:prstGeom prst="straightConnector1">
-            <a:avLst/>
-          </a:prstGeom>
-          <a:ln>
-            <a:tailEnd type="triangle"/>
-          </a:ln>
-        </p:spPr>
-        <p:style>
-          <a:lnRef idx="1">
-            <a:schemeClr val="dk1"/>
-          </a:lnRef>
-          <a:fillRef idx="0">
-            <a:schemeClr val="dk1"/>
-          </a:fillRef>
-          <a:effectRef idx="0">
-            <a:schemeClr val="dk1"/>
-          </a:effectRef>
-          <a:fontRef idx="minor">
-            <a:schemeClr val="tx1"/>
-          </a:fontRef>
-        </p:style>
-      </p:cxnSp>
-      <p:sp>
-        <p:nvSpPr>
-          <p:cNvPr id="5" name="Flowchart: Process 4">
-            <a:extLst>
-              <a:ext uri="{FF2B5EF4-FFF2-40B4-BE49-F238E27FC236}">
-                <a16:creationId xmlns:a16="http://schemas.microsoft.com/office/drawing/2014/main" id="{72A88A28-0B05-A03A-F47A-2329A9ADA486}"/>
-              </a:ext>
-            </a:extLst>
-          </p:cNvPr>
-          <p:cNvSpPr/>
-          <p:nvPr/>
-        </p:nvSpPr>
-        <p:spPr>
-          <a:xfrm>
-            <a:off x="1606020" y="3625416"/>
-            <a:ext cx="1201216" cy="304801"/>
-          </a:xfrm>
-          <a:prstGeom prst="flowChartProcess">
-            <a:avLst/>
-          </a:prstGeom>
-          <a:noFill/>
-          <a:ln w="9525" cap="flat" cmpd="sng" algn="ctr">
-            <a:solidFill>
-              <a:schemeClr val="accent1"/>
-            </a:solidFill>
-            <a:prstDash val="solid"/>
-            <a:round/>
-            <a:headEnd type="none" w="med" len="med"/>
-            <a:tailEnd type="none" w="med" len="med"/>
-          </a:ln>
-        </p:spPr>
-        <p:style>
-          <a:lnRef idx="0">
-            <a:scrgbClr r="0" g="0" b="0"/>
-          </a:lnRef>
-          <a:fillRef idx="0">
-            <a:scrgbClr r="0" g="0" b="0"/>
-          </a:fillRef>
-          <a:effectRef idx="0">
-            <a:scrgbClr r="0" g="0" b="0"/>
-          </a:effectRef>
-          <a:fontRef idx="minor">
-            <a:schemeClr val="accent1"/>
-          </a:fontRef>
-        </p:style>
-        <p:txBody>
-          <a:bodyPr lIns="0" tIns="0" rIns="0" bIns="0" rtlCol="0" anchor="ctr"/>
-          <a:lstStyle/>
-          <a:p>
-            <a:pPr algn="ctr"/>
-            <a:r>
-              <a:rPr lang="en-US" sz="1400" dirty="0"/>
-              <a:t>Action NPC 1</a:t>
-            </a:r>
-          </a:p>
-        </p:txBody>
-      </p:sp>
-      <p:sp>
-        <p:nvSpPr>
-          <p:cNvPr id="6" name="Flowchart: Process 5">
-            <a:extLst>
-              <a:ext uri="{FF2B5EF4-FFF2-40B4-BE49-F238E27FC236}">
-                <a16:creationId xmlns:a16="http://schemas.microsoft.com/office/drawing/2014/main" id="{6B5BC141-0050-1BAA-ACFD-B05EEDF239F7}"/>
-              </a:ext>
-            </a:extLst>
-          </p:cNvPr>
-          <p:cNvSpPr/>
-          <p:nvPr/>
-        </p:nvSpPr>
-        <p:spPr>
-          <a:xfrm>
-            <a:off x="2982966" y="3629577"/>
-            <a:ext cx="1201216" cy="304801"/>
-          </a:xfrm>
-          <a:prstGeom prst="flowChartProcess">
-            <a:avLst/>
-          </a:prstGeom>
-          <a:noFill/>
-          <a:ln w="9525" cap="flat" cmpd="sng" algn="ctr">
-            <a:solidFill>
-              <a:schemeClr val="accent1"/>
-            </a:solidFill>
-            <a:prstDash val="solid"/>
-            <a:round/>
-            <a:headEnd type="none" w="med" len="med"/>
-            <a:tailEnd type="none" w="med" len="med"/>
-          </a:ln>
-        </p:spPr>
-        <p:style>
-          <a:lnRef idx="0">
-            <a:scrgbClr r="0" g="0" b="0"/>
-          </a:lnRef>
-          <a:fillRef idx="0">
-            <a:scrgbClr r="0" g="0" b="0"/>
-          </a:fillRef>
-          <a:effectRef idx="0">
-            <a:scrgbClr r="0" g="0" b="0"/>
-          </a:effectRef>
-          <a:fontRef idx="minor">
-            <a:schemeClr val="accent1"/>
-          </a:fontRef>
-        </p:style>
-        <p:txBody>
-          <a:bodyPr lIns="0" tIns="0" rIns="0" bIns="0" rtlCol="0" anchor="ctr"/>
-          <a:lstStyle/>
-          <a:p>
-            <a:pPr algn="ctr"/>
-            <a:r>
-              <a:rPr lang="en-US" sz="1400" dirty="0"/>
-              <a:t>Action NPC 2</a:t>
-            </a:r>
-          </a:p>
-        </p:txBody>
-      </p:sp>
-      <p:sp>
-        <p:nvSpPr>
-          <p:cNvPr id="7" name="Flowchart: Process 6">
-            <a:extLst>
-              <a:ext uri="{FF2B5EF4-FFF2-40B4-BE49-F238E27FC236}">
-                <a16:creationId xmlns:a16="http://schemas.microsoft.com/office/drawing/2014/main" id="{63FE3F6C-EC35-F9F2-5B25-3D74DD8DEDD4}"/>
-              </a:ext>
-            </a:extLst>
-          </p:cNvPr>
-          <p:cNvSpPr/>
-          <p:nvPr/>
-        </p:nvSpPr>
-        <p:spPr>
-          <a:xfrm>
-            <a:off x="4359912" y="3646089"/>
-            <a:ext cx="1201216" cy="304801"/>
-          </a:xfrm>
-          <a:prstGeom prst="flowChartProcess">
-            <a:avLst/>
-          </a:prstGeom>
-          <a:noFill/>
-          <a:ln w="9525" cap="flat" cmpd="sng" algn="ctr">
-            <a:solidFill>
-              <a:schemeClr val="accent1"/>
-            </a:solidFill>
-            <a:prstDash val="solid"/>
-            <a:round/>
-            <a:headEnd type="none" w="med" len="med"/>
-            <a:tailEnd type="none" w="med" len="med"/>
-          </a:ln>
-        </p:spPr>
-        <p:style>
-          <a:lnRef idx="0">
-            <a:scrgbClr r="0" g="0" b="0"/>
-          </a:lnRef>
-          <a:fillRef idx="0">
-            <a:scrgbClr r="0" g="0" b="0"/>
-          </a:fillRef>
-          <a:effectRef idx="0">
-            <a:scrgbClr r="0" g="0" b="0"/>
-          </a:effectRef>
-          <a:fontRef idx="minor">
-            <a:schemeClr val="accent1"/>
-          </a:fontRef>
-        </p:style>
-        <p:txBody>
-          <a:bodyPr lIns="0" tIns="0" rIns="0" bIns="0" rtlCol="0" anchor="ctr"/>
-          <a:lstStyle/>
-          <a:p>
-            <a:pPr algn="ctr"/>
-            <a:r>
-              <a:rPr lang="en-US" sz="1400" dirty="0"/>
-              <a:t>…</a:t>
-            </a:r>
-          </a:p>
-        </p:txBody>
-      </p:sp>
-      <p:sp>
-        <p:nvSpPr>
-          <p:cNvPr id="9" name="Flowchart: Process 8">
-            <a:extLst>
-              <a:ext uri="{FF2B5EF4-FFF2-40B4-BE49-F238E27FC236}">
-                <a16:creationId xmlns:a16="http://schemas.microsoft.com/office/drawing/2014/main" id="{C07DA247-171C-0809-5951-0CACB432C27A}"/>
-              </a:ext>
-            </a:extLst>
-          </p:cNvPr>
-          <p:cNvSpPr/>
-          <p:nvPr/>
-        </p:nvSpPr>
-        <p:spPr>
-          <a:xfrm>
-            <a:off x="5812571" y="3627990"/>
-            <a:ext cx="1201216" cy="304801"/>
-          </a:xfrm>
-          <a:prstGeom prst="flowChartProcess">
-            <a:avLst/>
-          </a:prstGeom>
-          <a:noFill/>
-          <a:ln w="9525" cap="flat" cmpd="sng" algn="ctr">
-            <a:solidFill>
-              <a:schemeClr val="accent1"/>
-            </a:solidFill>
-            <a:prstDash val="solid"/>
-            <a:round/>
-            <a:headEnd type="none" w="med" len="med"/>
-            <a:tailEnd type="none" w="med" len="med"/>
-          </a:ln>
-        </p:spPr>
-        <p:style>
-          <a:lnRef idx="0">
-            <a:scrgbClr r="0" g="0" b="0"/>
-          </a:lnRef>
-          <a:fillRef idx="0">
-            <a:scrgbClr r="0" g="0" b="0"/>
-          </a:fillRef>
-          <a:effectRef idx="0">
-            <a:scrgbClr r="0" g="0" b="0"/>
-          </a:effectRef>
-          <a:fontRef idx="minor">
-            <a:schemeClr val="accent1"/>
-          </a:fontRef>
-        </p:style>
-        <p:txBody>
-          <a:bodyPr lIns="0" tIns="0" rIns="0" bIns="0" rtlCol="0" anchor="ctr"/>
-          <a:lstStyle/>
-          <a:p>
-            <a:pPr algn="ctr"/>
-            <a:r>
-              <a:rPr lang="en-US" sz="1400" dirty="0"/>
-              <a:t>Action NPC n</a:t>
-            </a:r>
-          </a:p>
-        </p:txBody>
-      </p:sp>
-      <p:sp>
-        <p:nvSpPr>
-          <p:cNvPr id="3" name="Left Brace 2">
-            <a:extLst>
-              <a:ext uri="{FF2B5EF4-FFF2-40B4-BE49-F238E27FC236}">
-                <a16:creationId xmlns:a16="http://schemas.microsoft.com/office/drawing/2014/main" id="{56B9D1FC-6629-D2B4-4FBC-99E57BA6B170}"/>
-              </a:ext>
-            </a:extLst>
-          </p:cNvPr>
-          <p:cNvSpPr/>
-          <p:nvPr/>
-        </p:nvSpPr>
-        <p:spPr>
-          <a:xfrm>
-            <a:off x="993494" y="3471085"/>
-            <a:ext cx="803903" cy="593820"/>
-          </a:xfrm>
-          <a:prstGeom prst="leftBrace">
-            <a:avLst/>
-          </a:prstGeom>
-          <a:ln w="19050"/>
-        </p:spPr>
-        <p:style>
-          <a:lnRef idx="1">
-            <a:schemeClr val="accent1"/>
-          </a:lnRef>
-          <a:fillRef idx="0">
-            <a:schemeClr val="accent1"/>
-          </a:fillRef>
-          <a:effectRef idx="0">
-            <a:schemeClr val="accent1"/>
-          </a:effectRef>
-          <a:fontRef idx="minor">
-            <a:schemeClr val="tx1"/>
-          </a:fontRef>
-        </p:style>
-        <p:txBody>
-          <a:bodyPr rtlCol="0" anchor="ctr"/>
-          <a:lstStyle/>
-          <a:p>
-            <a:pPr algn="ctr"/>
-            <a:endParaRPr lang="en-GB"/>
-          </a:p>
-        </p:txBody>
-      </p:sp>
-      <p:cxnSp>
-        <p:nvCxnSpPr>
-          <p:cNvPr id="8" name="Connector: Elbow 7">
-            <a:extLst>
-              <a:ext uri="{FF2B5EF4-FFF2-40B4-BE49-F238E27FC236}">
-                <a16:creationId xmlns:a16="http://schemas.microsoft.com/office/drawing/2014/main" id="{CCE6D6B5-619C-87E1-4BD6-39B6C19975AF}"/>
-              </a:ext>
-            </a:extLst>
-          </p:cNvPr>
-          <p:cNvCxnSpPr>
-            <a:stCxn id="51" idx="2"/>
-            <a:endCxn id="3" idx="1"/>
-          </p:cNvCxnSpPr>
-          <p:nvPr/>
-        </p:nvCxnSpPr>
-        <p:spPr>
-          <a:xfrm rot="16200000" flipH="1">
-            <a:off x="408395" y="3182896"/>
-            <a:ext cx="940952" cy="229245"/>
-          </a:xfrm>
-          <a:prstGeom prst="bentConnector2">
-            <a:avLst/>
-          </a:prstGeom>
-          <a:ln w="19050">
-            <a:tailEnd type="triangle"/>
-          </a:ln>
-        </p:spPr>
-        <p:style>
-          <a:lnRef idx="1">
-            <a:schemeClr val="accent1"/>
-          </a:lnRef>
-          <a:fillRef idx="0">
-            <a:schemeClr val="accent1"/>
-          </a:fillRef>
-          <a:effectRef idx="0">
-            <a:schemeClr val="accent1"/>
-          </a:effectRef>
-          <a:fontRef idx="minor">
-            <a:schemeClr val="tx1"/>
-          </a:fontRef>
-        </p:style>
-      </p:cxnSp>
-    </p:spTree>
-    <p:extLst>
-      <p:ext uri="{BB962C8B-B14F-4D97-AF65-F5344CB8AC3E}">
-        <p14:creationId xmlns:p14="http://schemas.microsoft.com/office/powerpoint/2010/main" val="226408533"/>
-      </p:ext>
-    </p:extLst>
-  </p:cSld>
-  <p:clrMapOvr>
-    <a:masterClrMapping/>
-  </p:clrMapOvr>
-</p:sld>
-</file>
-
-<file path=ppt/slides/slide4.xml><?xml version="1.0" encoding="utf-8"?>
-<p:sld xmlns:a="http://schemas.openxmlformats.org/drawingml/2006/main" xmlns:r="http://schemas.openxmlformats.org/officeDocument/2006/relationships" xmlns:p="http://schemas.openxmlformats.org/presentationml/2006/main">
-  <p:cSld>
-    <p:spTree>
-      <p:nvGrpSpPr>
-        <p:cNvPr id="1" name=""/>
-        <p:cNvGrpSpPr/>
-        <p:nvPr/>
-      </p:nvGrpSpPr>
-      <p:grpSpPr>
-        <a:xfrm>
-          <a:off x="0" y="0"/>
-          <a:ext cx="0" cy="0"/>
-          <a:chOff x="0" y="0"/>
-          <a:chExt cx="0" cy="0"/>
-        </a:xfrm>
-      </p:grpSpPr>
-      <p:sp>
-        <p:nvSpPr>
           <p:cNvPr id="4" name="Title 3">
             <a:extLst>
               <a:ext uri="{FF2B5EF4-FFF2-40B4-BE49-F238E27FC236}">
@@ -37614,7 +35856,7 @@
 </p:sld>
 </file>
 
-<file path=ppt/slides/slide5.xml><?xml version="1.0" encoding="utf-8"?>
+<file path=ppt/slides/slide4.xml><?xml version="1.0" encoding="utf-8"?>
 <p:sld xmlns:a="http://schemas.openxmlformats.org/drawingml/2006/main" xmlns:r="http://schemas.openxmlformats.org/officeDocument/2006/relationships" xmlns:p="http://schemas.openxmlformats.org/presentationml/2006/main">
   <p:cSld>
     <p:spTree>
@@ -38317,6 +36559,997 @@
     <p:extLst>
       <p:ext uri="{BB962C8B-B14F-4D97-AF65-F5344CB8AC3E}">
         <p14:creationId xmlns:p14="http://schemas.microsoft.com/office/powerpoint/2010/main" val="1625004584"/>
+      </p:ext>
+    </p:extLst>
+  </p:cSld>
+  <p:clrMapOvr>
+    <a:masterClrMapping/>
+  </p:clrMapOvr>
+</p:sld>
+</file>
+
+<file path=ppt/slides/slide5.xml><?xml version="1.0" encoding="utf-8"?>
+<p:sld xmlns:a="http://schemas.openxmlformats.org/drawingml/2006/main" xmlns:r="http://schemas.openxmlformats.org/officeDocument/2006/relationships" xmlns:p="http://schemas.openxmlformats.org/presentationml/2006/main">
+  <p:cSld>
+    <p:spTree>
+      <p:nvGrpSpPr>
+        <p:cNvPr id="1" name=""/>
+        <p:cNvGrpSpPr/>
+        <p:nvPr/>
+      </p:nvGrpSpPr>
+      <p:grpSpPr>
+        <a:xfrm>
+          <a:off x="0" y="0"/>
+          <a:ext cx="0" cy="0"/>
+          <a:chOff x="0" y="0"/>
+          <a:chExt cx="0" cy="0"/>
+        </a:xfrm>
+      </p:grpSpPr>
+      <p:sp>
+        <p:nvSpPr>
+          <p:cNvPr id="2" name="Title 1">
+            <a:extLst>
+              <a:ext uri="{FF2B5EF4-FFF2-40B4-BE49-F238E27FC236}">
+                <a16:creationId xmlns:a16="http://schemas.microsoft.com/office/drawing/2014/main" id="{4451EF0B-E233-9BA6-98AE-441E5A44AAFB}"/>
+              </a:ext>
+            </a:extLst>
+          </p:cNvPr>
+          <p:cNvSpPr>
+            <a:spLocks noGrp="1"/>
+          </p:cNvSpPr>
+          <p:nvPr>
+            <p:ph type="title"/>
+          </p:nvPr>
+        </p:nvSpPr>
+        <p:spPr/>
+        <p:txBody>
+          <a:bodyPr/>
+          <a:lstStyle/>
+          <a:p>
+            <a:endParaRPr lang="en-GB"/>
+          </a:p>
+        </p:txBody>
+      </p:sp>
+      <p:sp>
+        <p:nvSpPr>
+          <p:cNvPr id="4" name="Rectangle 3">
+            <a:extLst>
+              <a:ext uri="{FF2B5EF4-FFF2-40B4-BE49-F238E27FC236}">
+                <a16:creationId xmlns:a16="http://schemas.microsoft.com/office/drawing/2014/main" id="{B898BB00-2F13-CC63-5F22-B263A52AC884}"/>
+              </a:ext>
+            </a:extLst>
+          </p:cNvPr>
+          <p:cNvSpPr/>
+          <p:nvPr/>
+        </p:nvSpPr>
+        <p:spPr>
+          <a:xfrm>
+            <a:off x="3657600" y="2286000"/>
+            <a:ext cx="4191000" cy="1447800"/>
+          </a:xfrm>
+          <a:prstGeom prst="rect">
+            <a:avLst/>
+          </a:prstGeom>
+          <a:solidFill>
+            <a:schemeClr val="accent1"/>
+          </a:solidFill>
+          <a:ln>
+            <a:noFill/>
+          </a:ln>
+          <a:effectLst/>
+        </p:spPr>
+        <p:style>
+          <a:lnRef idx="1">
+            <a:schemeClr val="accent1"/>
+          </a:lnRef>
+          <a:fillRef idx="3">
+            <a:schemeClr val="accent1"/>
+          </a:fillRef>
+          <a:effectRef idx="2">
+            <a:schemeClr val="accent1"/>
+          </a:effectRef>
+          <a:fontRef idx="minor">
+            <a:schemeClr val="lt1"/>
+          </a:fontRef>
+        </p:style>
+        <p:txBody>
+          <a:bodyPr rtlCol="0" anchor="t"/>
+          <a:lstStyle/>
+          <a:p>
+            <a:pPr algn="ctr"/>
+            <a:r>
+              <a:rPr lang="en-GB" sz="2000" dirty="0"/>
+              <a:t>Traffic Manger</a:t>
+            </a:r>
+          </a:p>
+        </p:txBody>
+      </p:sp>
+      <p:sp>
+        <p:nvSpPr>
+          <p:cNvPr id="5" name="Rectangle 4">
+            <a:extLst>
+              <a:ext uri="{FF2B5EF4-FFF2-40B4-BE49-F238E27FC236}">
+                <a16:creationId xmlns:a16="http://schemas.microsoft.com/office/drawing/2014/main" id="{554E5DE5-B0E8-9754-7882-9EE34F418A30}"/>
+              </a:ext>
+            </a:extLst>
+          </p:cNvPr>
+          <p:cNvSpPr/>
+          <p:nvPr/>
+        </p:nvSpPr>
+        <p:spPr>
+          <a:xfrm>
+            <a:off x="4114800" y="3009900"/>
+            <a:ext cx="3429000" cy="723900"/>
+          </a:xfrm>
+          <a:prstGeom prst="rect">
+            <a:avLst/>
+          </a:prstGeom>
+          <a:solidFill>
+            <a:schemeClr val="accent3"/>
+          </a:solidFill>
+          <a:ln>
+            <a:noFill/>
+          </a:ln>
+        </p:spPr>
+        <p:style>
+          <a:lnRef idx="0">
+            <a:scrgbClr r="0" g="0" b="0"/>
+          </a:lnRef>
+          <a:fillRef idx="0">
+            <a:scrgbClr r="0" g="0" b="0"/>
+          </a:fillRef>
+          <a:effectRef idx="0">
+            <a:scrgbClr r="0" g="0" b="0"/>
+          </a:effectRef>
+          <a:fontRef idx="minor">
+            <a:schemeClr val="lt1"/>
+          </a:fontRef>
+        </p:style>
+        <p:txBody>
+          <a:bodyPr rtlCol="0" anchor="t"/>
+          <a:lstStyle/>
+          <a:p>
+            <a:pPr algn="ctr"/>
+            <a:r>
+              <a:rPr lang="en-GB" sz="1800" dirty="0"/>
+              <a:t>Action Interface</a:t>
+            </a:r>
+          </a:p>
+        </p:txBody>
+      </p:sp>
+      <p:sp>
+        <p:nvSpPr>
+          <p:cNvPr id="7" name="Rectangle 6">
+            <a:extLst>
+              <a:ext uri="{FF2B5EF4-FFF2-40B4-BE49-F238E27FC236}">
+                <a16:creationId xmlns:a16="http://schemas.microsoft.com/office/drawing/2014/main" id="{A35A4DBE-7B59-A9A0-0AE7-70C822A7338D}"/>
+              </a:ext>
+            </a:extLst>
+          </p:cNvPr>
+          <p:cNvSpPr/>
+          <p:nvPr/>
+        </p:nvSpPr>
+        <p:spPr>
+          <a:xfrm>
+            <a:off x="5181600" y="3429000"/>
+            <a:ext cx="685800" cy="226800"/>
+          </a:xfrm>
+          <a:prstGeom prst="rect">
+            <a:avLst/>
+          </a:prstGeom>
+          <a:solidFill>
+            <a:schemeClr val="accent1"/>
+          </a:solidFill>
+          <a:ln>
+            <a:noFill/>
+          </a:ln>
+          <a:effectLst/>
+        </p:spPr>
+        <p:style>
+          <a:lnRef idx="1">
+            <a:schemeClr val="accent1"/>
+          </a:lnRef>
+          <a:fillRef idx="3">
+            <a:schemeClr val="accent1"/>
+          </a:fillRef>
+          <a:effectRef idx="2">
+            <a:schemeClr val="accent1"/>
+          </a:effectRef>
+          <a:fontRef idx="minor">
+            <a:schemeClr val="lt1"/>
+          </a:fontRef>
+        </p:style>
+        <p:txBody>
+          <a:bodyPr rtlCol="0" anchor="ctr"/>
+          <a:lstStyle/>
+          <a:p>
+            <a:pPr algn="ctr"/>
+            <a:r>
+              <a:rPr lang="en-GB" sz="1200" dirty="0"/>
+              <a:t>NPC 1</a:t>
+            </a:r>
+          </a:p>
+        </p:txBody>
+      </p:sp>
+      <p:sp>
+        <p:nvSpPr>
+          <p:cNvPr id="10" name="Rectangle 9">
+            <a:extLst>
+              <a:ext uri="{FF2B5EF4-FFF2-40B4-BE49-F238E27FC236}">
+                <a16:creationId xmlns:a16="http://schemas.microsoft.com/office/drawing/2014/main" id="{D2AE361C-E408-52A8-C22B-948958297845}"/>
+              </a:ext>
+            </a:extLst>
+          </p:cNvPr>
+          <p:cNvSpPr/>
+          <p:nvPr/>
+        </p:nvSpPr>
+        <p:spPr>
+          <a:xfrm>
+            <a:off x="5105400" y="3351000"/>
+            <a:ext cx="2362200" cy="382800"/>
+          </a:xfrm>
+          <a:prstGeom prst="rect">
+            <a:avLst/>
+          </a:prstGeom>
+          <a:noFill/>
+          <a:ln w="9525" cap="flat" cmpd="sng" algn="ctr">
+            <a:solidFill>
+              <a:schemeClr val="accent1"/>
+            </a:solidFill>
+            <a:prstDash val="solid"/>
+            <a:round/>
+            <a:headEnd type="none" w="med" len="med"/>
+            <a:tailEnd type="none" w="med" len="med"/>
+          </a:ln>
+        </p:spPr>
+        <p:style>
+          <a:lnRef idx="0">
+            <a:scrgbClr r="0" g="0" b="0"/>
+          </a:lnRef>
+          <a:fillRef idx="0">
+            <a:scrgbClr r="0" g="0" b="0"/>
+          </a:fillRef>
+          <a:effectRef idx="0">
+            <a:scrgbClr r="0" g="0" b="0"/>
+          </a:effectRef>
+          <a:fontRef idx="minor">
+            <a:schemeClr val="accent1"/>
+          </a:fontRef>
+        </p:style>
+        <p:txBody>
+          <a:bodyPr rtlCol="0" anchor="ctr"/>
+          <a:lstStyle/>
+          <a:p>
+            <a:pPr algn="ctr"/>
+            <a:endParaRPr lang="en-GB"/>
+          </a:p>
+        </p:txBody>
+      </p:sp>
+      <p:sp>
+        <p:nvSpPr>
+          <p:cNvPr id="11" name="Rectangle 10">
+            <a:extLst>
+              <a:ext uri="{FF2B5EF4-FFF2-40B4-BE49-F238E27FC236}">
+                <a16:creationId xmlns:a16="http://schemas.microsoft.com/office/drawing/2014/main" id="{D64B7549-4671-D790-705F-F8A084C798FA}"/>
+              </a:ext>
+            </a:extLst>
+          </p:cNvPr>
+          <p:cNvSpPr/>
+          <p:nvPr/>
+        </p:nvSpPr>
+        <p:spPr>
+          <a:xfrm>
+            <a:off x="5943600" y="3429000"/>
+            <a:ext cx="685800" cy="226800"/>
+          </a:xfrm>
+          <a:prstGeom prst="rect">
+            <a:avLst/>
+          </a:prstGeom>
+          <a:solidFill>
+            <a:schemeClr val="accent1"/>
+          </a:solidFill>
+          <a:ln>
+            <a:noFill/>
+          </a:ln>
+          <a:effectLst/>
+        </p:spPr>
+        <p:style>
+          <a:lnRef idx="1">
+            <a:schemeClr val="accent1"/>
+          </a:lnRef>
+          <a:fillRef idx="3">
+            <a:schemeClr val="accent1"/>
+          </a:fillRef>
+          <a:effectRef idx="2">
+            <a:schemeClr val="accent1"/>
+          </a:effectRef>
+          <a:fontRef idx="minor">
+            <a:schemeClr val="lt1"/>
+          </a:fontRef>
+        </p:style>
+        <p:txBody>
+          <a:bodyPr rtlCol="0" anchor="ctr"/>
+          <a:lstStyle/>
+          <a:p>
+            <a:pPr algn="ctr"/>
+            <a:r>
+              <a:rPr lang="en-GB" sz="1200" dirty="0"/>
+              <a:t>NPC 2</a:t>
+            </a:r>
+          </a:p>
+        </p:txBody>
+      </p:sp>
+      <p:sp>
+        <p:nvSpPr>
+          <p:cNvPr id="12" name="Rectangle 11">
+            <a:extLst>
+              <a:ext uri="{FF2B5EF4-FFF2-40B4-BE49-F238E27FC236}">
+                <a16:creationId xmlns:a16="http://schemas.microsoft.com/office/drawing/2014/main" id="{6AB30BE7-507F-3FD0-0B00-88FF9549FBBD}"/>
+              </a:ext>
+            </a:extLst>
+          </p:cNvPr>
+          <p:cNvSpPr/>
+          <p:nvPr/>
+        </p:nvSpPr>
+        <p:spPr>
+          <a:xfrm>
+            <a:off x="6705600" y="3429000"/>
+            <a:ext cx="685800" cy="226800"/>
+          </a:xfrm>
+          <a:prstGeom prst="rect">
+            <a:avLst/>
+          </a:prstGeom>
+          <a:solidFill>
+            <a:schemeClr val="accent1"/>
+          </a:solidFill>
+          <a:ln>
+            <a:noFill/>
+          </a:ln>
+          <a:effectLst/>
+        </p:spPr>
+        <p:style>
+          <a:lnRef idx="1">
+            <a:schemeClr val="accent1"/>
+          </a:lnRef>
+          <a:fillRef idx="3">
+            <a:schemeClr val="accent1"/>
+          </a:fillRef>
+          <a:effectRef idx="2">
+            <a:schemeClr val="accent1"/>
+          </a:effectRef>
+          <a:fontRef idx="minor">
+            <a:schemeClr val="lt1"/>
+          </a:fontRef>
+        </p:style>
+        <p:txBody>
+          <a:bodyPr rtlCol="0" anchor="ctr"/>
+          <a:lstStyle/>
+          <a:p>
+            <a:pPr algn="ctr"/>
+            <a:r>
+              <a:rPr lang="en-GB" sz="1200" dirty="0"/>
+              <a:t>…</a:t>
+            </a:r>
+          </a:p>
+        </p:txBody>
+      </p:sp>
+      <p:sp>
+        <p:nvSpPr>
+          <p:cNvPr id="13" name="Rectangle 12">
+            <a:extLst>
+              <a:ext uri="{FF2B5EF4-FFF2-40B4-BE49-F238E27FC236}">
+                <a16:creationId xmlns:a16="http://schemas.microsoft.com/office/drawing/2014/main" id="{DBBB9255-1895-9EE9-E4AA-017EE8A6C5D1}"/>
+              </a:ext>
+            </a:extLst>
+          </p:cNvPr>
+          <p:cNvSpPr/>
+          <p:nvPr/>
+        </p:nvSpPr>
+        <p:spPr>
+          <a:xfrm>
+            <a:off x="4267200" y="3507000"/>
+            <a:ext cx="685800" cy="226800"/>
+          </a:xfrm>
+          <a:prstGeom prst="rect">
+            <a:avLst/>
+          </a:prstGeom>
+          <a:solidFill>
+            <a:schemeClr val="accent1"/>
+          </a:solidFill>
+          <a:ln>
+            <a:noFill/>
+          </a:ln>
+          <a:effectLst/>
+        </p:spPr>
+        <p:style>
+          <a:lnRef idx="1">
+            <a:schemeClr val="accent1"/>
+          </a:lnRef>
+          <a:fillRef idx="3">
+            <a:schemeClr val="accent1"/>
+          </a:fillRef>
+          <a:effectRef idx="2">
+            <a:schemeClr val="accent1"/>
+          </a:effectRef>
+          <a:fontRef idx="minor">
+            <a:schemeClr val="lt1"/>
+          </a:fontRef>
+        </p:style>
+        <p:txBody>
+          <a:bodyPr rtlCol="0" anchor="ctr"/>
+          <a:lstStyle/>
+          <a:p>
+            <a:pPr algn="ctr"/>
+            <a:r>
+              <a:rPr lang="en-GB" sz="1200" dirty="0"/>
+              <a:t>EGO</a:t>
+            </a:r>
+          </a:p>
+        </p:txBody>
+      </p:sp>
+      <p:sp>
+        <p:nvSpPr>
+          <p:cNvPr id="14" name="Rectangle 13">
+            <a:extLst>
+              <a:ext uri="{FF2B5EF4-FFF2-40B4-BE49-F238E27FC236}">
+                <a16:creationId xmlns:a16="http://schemas.microsoft.com/office/drawing/2014/main" id="{CBD65BCB-FAFA-1711-E000-8322A6AF6035}"/>
+              </a:ext>
+            </a:extLst>
+          </p:cNvPr>
+          <p:cNvSpPr/>
+          <p:nvPr/>
+        </p:nvSpPr>
+        <p:spPr>
+          <a:xfrm>
+            <a:off x="304800" y="2286000"/>
+            <a:ext cx="1905000" cy="1447800"/>
+          </a:xfrm>
+          <a:prstGeom prst="rect">
+            <a:avLst/>
+          </a:prstGeom>
+          <a:solidFill>
+            <a:schemeClr val="accent2"/>
+          </a:solidFill>
+          <a:ln>
+            <a:noFill/>
+          </a:ln>
+        </p:spPr>
+        <p:style>
+          <a:lnRef idx="0">
+            <a:scrgbClr r="0" g="0" b="0"/>
+          </a:lnRef>
+          <a:fillRef idx="0">
+            <a:scrgbClr r="0" g="0" b="0"/>
+          </a:fillRef>
+          <a:effectRef idx="0">
+            <a:scrgbClr r="0" g="0" b="0"/>
+          </a:effectRef>
+          <a:fontRef idx="minor">
+            <a:schemeClr val="lt1"/>
+          </a:fontRef>
+        </p:style>
+        <p:txBody>
+          <a:bodyPr rtlCol="0" anchor="ctr"/>
+          <a:lstStyle/>
+          <a:p>
+            <a:pPr algn="ctr"/>
+            <a:r>
+              <a:rPr lang="en-GB" sz="2000" dirty="0"/>
+              <a:t>Behaviour Tree</a:t>
+            </a:r>
+          </a:p>
+        </p:txBody>
+      </p:sp>
+      <p:sp>
+        <p:nvSpPr>
+          <p:cNvPr id="16" name="Rectangle 15">
+            <a:extLst>
+              <a:ext uri="{FF2B5EF4-FFF2-40B4-BE49-F238E27FC236}">
+                <a16:creationId xmlns:a16="http://schemas.microsoft.com/office/drawing/2014/main" id="{B7C52942-5D59-F015-E512-C83DB1A8AABB}"/>
+              </a:ext>
+            </a:extLst>
+          </p:cNvPr>
+          <p:cNvSpPr/>
+          <p:nvPr/>
+        </p:nvSpPr>
+        <p:spPr>
+          <a:xfrm>
+            <a:off x="9296400" y="2275633"/>
+            <a:ext cx="1905000" cy="1447800"/>
+          </a:xfrm>
+          <a:prstGeom prst="rect">
+            <a:avLst/>
+          </a:prstGeom>
+          <a:solidFill>
+            <a:schemeClr val="accent5"/>
+          </a:solidFill>
+          <a:ln>
+            <a:noFill/>
+          </a:ln>
+        </p:spPr>
+        <p:style>
+          <a:lnRef idx="0">
+            <a:scrgbClr r="0" g="0" b="0"/>
+          </a:lnRef>
+          <a:fillRef idx="0">
+            <a:scrgbClr r="0" g="0" b="0"/>
+          </a:fillRef>
+          <a:effectRef idx="0">
+            <a:scrgbClr r="0" g="0" b="0"/>
+          </a:effectRef>
+          <a:fontRef idx="minor">
+            <a:schemeClr val="lt1"/>
+          </a:fontRef>
+        </p:style>
+        <p:txBody>
+          <a:bodyPr rtlCol="0" anchor="ctr"/>
+          <a:lstStyle/>
+          <a:p>
+            <a:pPr algn="ctr"/>
+            <a:r>
+              <a:rPr lang="en-GB" sz="2000" dirty="0"/>
+              <a:t>Genetic Algorithm</a:t>
+            </a:r>
+          </a:p>
+        </p:txBody>
+      </p:sp>
+      <p:cxnSp>
+        <p:nvCxnSpPr>
+          <p:cNvPr id="18" name="Straight Arrow Connector 17">
+            <a:extLst>
+              <a:ext uri="{FF2B5EF4-FFF2-40B4-BE49-F238E27FC236}">
+                <a16:creationId xmlns:a16="http://schemas.microsoft.com/office/drawing/2014/main" id="{6343CAC1-F3E8-4A2E-BE22-CADBAD3D408C}"/>
+              </a:ext>
+            </a:extLst>
+          </p:cNvPr>
+          <p:cNvCxnSpPr>
+            <a:cxnSpLocks/>
+            <a:stCxn id="4" idx="1"/>
+            <a:endCxn id="14" idx="3"/>
+          </p:cNvCxnSpPr>
+          <p:nvPr/>
+        </p:nvCxnSpPr>
+        <p:spPr>
+          <a:xfrm flipH="1">
+            <a:off x="2209800" y="3009900"/>
+            <a:ext cx="1447800" cy="0"/>
+          </a:xfrm>
+          <a:prstGeom prst="straightConnector1">
+            <a:avLst/>
+          </a:prstGeom>
+          <a:ln>
+            <a:tailEnd type="triangle"/>
+          </a:ln>
+        </p:spPr>
+        <p:style>
+          <a:lnRef idx="1">
+            <a:schemeClr val="accent1"/>
+          </a:lnRef>
+          <a:fillRef idx="0">
+            <a:schemeClr val="accent1"/>
+          </a:fillRef>
+          <a:effectRef idx="0">
+            <a:schemeClr val="accent1"/>
+          </a:effectRef>
+          <a:fontRef idx="minor">
+            <a:schemeClr val="tx1"/>
+          </a:fontRef>
+        </p:style>
+      </p:cxnSp>
+      <p:cxnSp>
+        <p:nvCxnSpPr>
+          <p:cNvPr id="20" name="Straight Arrow Connector 19">
+            <a:extLst>
+              <a:ext uri="{FF2B5EF4-FFF2-40B4-BE49-F238E27FC236}">
+                <a16:creationId xmlns:a16="http://schemas.microsoft.com/office/drawing/2014/main" id="{00BC0C85-ED71-9429-D027-1872D80D6F5D}"/>
+              </a:ext>
+            </a:extLst>
+          </p:cNvPr>
+          <p:cNvCxnSpPr>
+            <a:cxnSpLocks/>
+            <a:stCxn id="4" idx="3"/>
+            <a:endCxn id="16" idx="1"/>
+          </p:cNvCxnSpPr>
+          <p:nvPr/>
+        </p:nvCxnSpPr>
+        <p:spPr>
+          <a:xfrm flipV="1">
+            <a:off x="7848600" y="2999533"/>
+            <a:ext cx="1447800" cy="10367"/>
+          </a:xfrm>
+          <a:prstGeom prst="straightConnector1">
+            <a:avLst/>
+          </a:prstGeom>
+          <a:ln>
+            <a:tailEnd type="triangle"/>
+          </a:ln>
+        </p:spPr>
+        <p:style>
+          <a:lnRef idx="1">
+            <a:schemeClr val="accent1"/>
+          </a:lnRef>
+          <a:fillRef idx="0">
+            <a:schemeClr val="accent1"/>
+          </a:fillRef>
+          <a:effectRef idx="0">
+            <a:schemeClr val="accent1"/>
+          </a:effectRef>
+          <a:fontRef idx="minor">
+            <a:schemeClr val="tx1"/>
+          </a:fontRef>
+        </p:style>
+      </p:cxnSp>
+      <p:cxnSp>
+        <p:nvCxnSpPr>
+          <p:cNvPr id="24" name="Connector: Elbow 23">
+            <a:extLst>
+              <a:ext uri="{FF2B5EF4-FFF2-40B4-BE49-F238E27FC236}">
+                <a16:creationId xmlns:a16="http://schemas.microsoft.com/office/drawing/2014/main" id="{0556D123-006B-85A3-CE64-4412CA1776AE}"/>
+              </a:ext>
+            </a:extLst>
+          </p:cNvPr>
+          <p:cNvCxnSpPr>
+            <a:stCxn id="16" idx="2"/>
+            <a:endCxn id="10" idx="2"/>
+          </p:cNvCxnSpPr>
+          <p:nvPr/>
+        </p:nvCxnSpPr>
+        <p:spPr>
+          <a:xfrm rot="5400000">
+            <a:off x="8262517" y="1747416"/>
+            <a:ext cx="10367" cy="3962400"/>
+          </a:xfrm>
+          <a:prstGeom prst="bentConnector3">
+            <a:avLst>
+              <a:gd name="adj1" fmla="val 2305074"/>
+            </a:avLst>
+          </a:prstGeom>
+          <a:ln>
+            <a:tailEnd type="triangle"/>
+          </a:ln>
+        </p:spPr>
+        <p:style>
+          <a:lnRef idx="1">
+            <a:schemeClr val="accent1"/>
+          </a:lnRef>
+          <a:fillRef idx="0">
+            <a:schemeClr val="accent1"/>
+          </a:fillRef>
+          <a:effectRef idx="0">
+            <a:schemeClr val="accent1"/>
+          </a:effectRef>
+          <a:fontRef idx="minor">
+            <a:schemeClr val="tx1"/>
+          </a:fontRef>
+        </p:style>
+      </p:cxnSp>
+      <p:cxnSp>
+        <p:nvCxnSpPr>
+          <p:cNvPr id="26" name="Connector: Elbow 25">
+            <a:extLst>
+              <a:ext uri="{FF2B5EF4-FFF2-40B4-BE49-F238E27FC236}">
+                <a16:creationId xmlns:a16="http://schemas.microsoft.com/office/drawing/2014/main" id="{90E36906-E56A-D57E-A703-C9288DDD8B37}"/>
+              </a:ext>
+            </a:extLst>
+          </p:cNvPr>
+          <p:cNvCxnSpPr>
+            <a:stCxn id="14" idx="2"/>
+            <a:endCxn id="13" idx="2"/>
+          </p:cNvCxnSpPr>
+          <p:nvPr/>
+        </p:nvCxnSpPr>
+        <p:spPr>
+          <a:xfrm rot="16200000" flipH="1">
+            <a:off x="2933700" y="2057400"/>
+            <a:ext cx="12700" cy="3352800"/>
+          </a:xfrm>
+          <a:prstGeom prst="bentConnector3">
+            <a:avLst>
+              <a:gd name="adj1" fmla="val 1800000"/>
+            </a:avLst>
+          </a:prstGeom>
+          <a:ln>
+            <a:tailEnd type="triangle"/>
+          </a:ln>
+        </p:spPr>
+        <p:style>
+          <a:lnRef idx="1">
+            <a:schemeClr val="accent1"/>
+          </a:lnRef>
+          <a:fillRef idx="0">
+            <a:schemeClr val="accent1"/>
+          </a:fillRef>
+          <a:effectRef idx="0">
+            <a:schemeClr val="accent1"/>
+          </a:effectRef>
+          <a:fontRef idx="minor">
+            <a:schemeClr val="tx1"/>
+          </a:fontRef>
+        </p:style>
+      </p:cxnSp>
+      <p:sp>
+        <p:nvSpPr>
+          <p:cNvPr id="29" name="Rectangle 28">
+            <a:extLst>
+              <a:ext uri="{FF2B5EF4-FFF2-40B4-BE49-F238E27FC236}">
+                <a16:creationId xmlns:a16="http://schemas.microsoft.com/office/drawing/2014/main" id="{3FFF8C99-EA30-4DB2-30D1-44FB160765D9}"/>
+              </a:ext>
+            </a:extLst>
+          </p:cNvPr>
+          <p:cNvSpPr/>
+          <p:nvPr/>
+        </p:nvSpPr>
+        <p:spPr>
+          <a:xfrm>
+            <a:off x="2362200" y="2590800"/>
+            <a:ext cx="1219200" cy="380998"/>
+          </a:xfrm>
+          <a:prstGeom prst="rect">
+            <a:avLst/>
+          </a:prstGeom>
+          <a:solidFill>
+            <a:schemeClr val="accent2">
+              <a:alpha val="50000"/>
+            </a:schemeClr>
+          </a:solidFill>
+          <a:ln>
+            <a:noFill/>
+          </a:ln>
+        </p:spPr>
+        <p:style>
+          <a:lnRef idx="0">
+            <a:scrgbClr r="0" g="0" b="0"/>
+          </a:lnRef>
+          <a:fillRef idx="0">
+            <a:scrgbClr r="0" g="0" b="0"/>
+          </a:fillRef>
+          <a:effectRef idx="0">
+            <a:scrgbClr r="0" g="0" b="0"/>
+          </a:effectRef>
+          <a:fontRef idx="minor">
+            <a:schemeClr val="lt1"/>
+          </a:fontRef>
+        </p:style>
+        <p:txBody>
+          <a:bodyPr rtlCol="0" anchor="ctr"/>
+          <a:lstStyle/>
+          <a:p>
+            <a:pPr algn="ctr"/>
+            <a:r>
+              <a:rPr lang="en-GB" sz="1200" dirty="0"/>
+              <a:t>World Information</a:t>
+            </a:r>
+          </a:p>
+        </p:txBody>
+      </p:sp>
+      <p:sp>
+        <p:nvSpPr>
+          <p:cNvPr id="32" name="Rectangle 31">
+            <a:extLst>
+              <a:ext uri="{FF2B5EF4-FFF2-40B4-BE49-F238E27FC236}">
+                <a16:creationId xmlns:a16="http://schemas.microsoft.com/office/drawing/2014/main" id="{E361B3A7-59D8-41DB-72FD-675D7BA1E4D2}"/>
+              </a:ext>
+            </a:extLst>
+          </p:cNvPr>
+          <p:cNvSpPr/>
+          <p:nvPr/>
+        </p:nvSpPr>
+        <p:spPr>
+          <a:xfrm>
+            <a:off x="7924800" y="2563338"/>
+            <a:ext cx="1219200" cy="380998"/>
+          </a:xfrm>
+          <a:prstGeom prst="rect">
+            <a:avLst/>
+          </a:prstGeom>
+          <a:solidFill>
+            <a:schemeClr val="accent5">
+              <a:alpha val="50000"/>
+            </a:schemeClr>
+          </a:solidFill>
+          <a:ln>
+            <a:noFill/>
+          </a:ln>
+        </p:spPr>
+        <p:style>
+          <a:lnRef idx="0">
+            <a:scrgbClr r="0" g="0" b="0"/>
+          </a:lnRef>
+          <a:fillRef idx="0">
+            <a:scrgbClr r="0" g="0" b="0"/>
+          </a:fillRef>
+          <a:effectRef idx="0">
+            <a:scrgbClr r="0" g="0" b="0"/>
+          </a:effectRef>
+          <a:fontRef idx="minor">
+            <a:schemeClr val="lt1"/>
+          </a:fontRef>
+        </p:style>
+        <p:txBody>
+          <a:bodyPr rtlCol="0" anchor="ctr"/>
+          <a:lstStyle/>
+          <a:p>
+            <a:pPr algn="ctr"/>
+            <a:r>
+              <a:rPr lang="en-GB" sz="1200" dirty="0"/>
+              <a:t>World Information</a:t>
+            </a:r>
+          </a:p>
+        </p:txBody>
+      </p:sp>
+    </p:spTree>
+    <p:extLst>
+      <p:ext uri="{BB962C8B-B14F-4D97-AF65-F5344CB8AC3E}">
+        <p14:creationId xmlns:p14="http://schemas.microsoft.com/office/powerpoint/2010/main" val="1366643385"/>
+      </p:ext>
+    </p:extLst>
+  </p:cSld>
+  <p:clrMapOvr>
+    <a:masterClrMapping/>
+  </p:clrMapOvr>
+</p:sld>
+</file>
+
+<file path=ppt/slides/slide6.xml><?xml version="1.0" encoding="utf-8"?>
+<p:sld xmlns:a="http://schemas.openxmlformats.org/drawingml/2006/main" xmlns:r="http://schemas.openxmlformats.org/officeDocument/2006/relationships" xmlns:p="http://schemas.openxmlformats.org/presentationml/2006/main">
+  <p:cSld>
+    <p:spTree>
+      <p:nvGrpSpPr>
+        <p:cNvPr id="1" name=""/>
+        <p:cNvGrpSpPr/>
+        <p:nvPr/>
+      </p:nvGrpSpPr>
+      <p:grpSpPr>
+        <a:xfrm>
+          <a:off x="0" y="0"/>
+          <a:ext cx="0" cy="0"/>
+          <a:chOff x="0" y="0"/>
+          <a:chExt cx="0" cy="0"/>
+        </a:xfrm>
+      </p:grpSpPr>
+      <p:sp>
+        <p:nvSpPr>
+          <p:cNvPr id="2" name="Title 1">
+            <a:extLst>
+              <a:ext uri="{FF2B5EF4-FFF2-40B4-BE49-F238E27FC236}">
+                <a16:creationId xmlns:a16="http://schemas.microsoft.com/office/drawing/2014/main" id="{117235E5-16D5-F3A2-3A9A-BA6D4E03FBB3}"/>
+              </a:ext>
+            </a:extLst>
+          </p:cNvPr>
+          <p:cNvSpPr>
+            <a:spLocks noGrp="1"/>
+          </p:cNvSpPr>
+          <p:nvPr>
+            <p:ph type="title"/>
+          </p:nvPr>
+        </p:nvSpPr>
+        <p:spPr/>
+        <p:txBody>
+          <a:bodyPr/>
+          <a:lstStyle/>
+          <a:p>
+            <a:endParaRPr lang="en-GB"/>
+          </a:p>
+        </p:txBody>
+      </p:sp>
+      <p:pic>
+        <p:nvPicPr>
+          <p:cNvPr id="7" name="Picture 6" descr="A graph with a diagram&#10;&#10;Description automatically generated with medium confidence">
+            <a:extLst>
+              <a:ext uri="{FF2B5EF4-FFF2-40B4-BE49-F238E27FC236}">
+                <a16:creationId xmlns:a16="http://schemas.microsoft.com/office/drawing/2014/main" id="{B099A407-FB6D-7F6C-F850-5783BBFA3BC1}"/>
+              </a:ext>
+            </a:extLst>
+          </p:cNvPr>
+          <p:cNvPicPr>
+            <a:picLocks noChangeAspect="1"/>
+          </p:cNvPicPr>
+          <p:nvPr/>
+        </p:nvPicPr>
+        <p:blipFill rotWithShape="1">
+          <a:blip r:embed="rId2" cstate="print">
+            <a:extLst>
+              <a:ext uri="{28A0092B-C50C-407E-A947-70E740481C1C}">
+                <a14:useLocalDpi xmlns:a14="http://schemas.microsoft.com/office/drawing/2010/main" val="0"/>
+              </a:ext>
+            </a:extLst>
+          </a:blip>
+          <a:srcRect l="2748"/>
+          <a:stretch/>
+        </p:blipFill>
+        <p:spPr>
+          <a:xfrm>
+            <a:off x="6248400" y="2057400"/>
+            <a:ext cx="5392800" cy="2772600"/>
+          </a:xfrm>
+          <a:prstGeom prst="rect">
+            <a:avLst/>
+          </a:prstGeom>
+        </p:spPr>
+      </p:pic>
+      <p:pic>
+        <p:nvPicPr>
+          <p:cNvPr id="5" name="Picture 4" descr="A graph with a blue line&#10;&#10;Description automatically generated">
+            <a:extLst>
+              <a:ext uri="{FF2B5EF4-FFF2-40B4-BE49-F238E27FC236}">
+                <a16:creationId xmlns:a16="http://schemas.microsoft.com/office/drawing/2014/main" id="{318732B1-578F-769E-508F-F27B1D118AD7}"/>
+              </a:ext>
+            </a:extLst>
+          </p:cNvPr>
+          <p:cNvPicPr>
+            <a:picLocks noChangeAspect="1"/>
+          </p:cNvPicPr>
+          <p:nvPr/>
+        </p:nvPicPr>
+        <p:blipFill rotWithShape="1">
+          <a:blip r:embed="rId3" cstate="print">
+            <a:extLst>
+              <a:ext uri="{28A0092B-C50C-407E-A947-70E740481C1C}">
+                <a14:useLocalDpi xmlns:a14="http://schemas.microsoft.com/office/drawing/2010/main" val="0"/>
+              </a:ext>
+            </a:extLst>
+          </a:blip>
+          <a:srcRect r="1374"/>
+          <a:stretch/>
+        </p:blipFill>
+        <p:spPr>
+          <a:xfrm>
+            <a:off x="779400" y="2057400"/>
+            <a:ext cx="5469000" cy="2772600"/>
+          </a:xfrm>
+          <a:prstGeom prst="rect">
+            <a:avLst/>
+          </a:prstGeom>
+        </p:spPr>
+      </p:pic>
+      <p:sp>
+        <p:nvSpPr>
+          <p:cNvPr id="8" name="TextBox 7">
+            <a:extLst>
+              <a:ext uri="{FF2B5EF4-FFF2-40B4-BE49-F238E27FC236}">
+                <a16:creationId xmlns:a16="http://schemas.microsoft.com/office/drawing/2014/main" id="{2539331C-DB74-5BB3-6445-DA596E38F763}"/>
+              </a:ext>
+            </a:extLst>
+          </p:cNvPr>
+          <p:cNvSpPr txBox="1"/>
+          <p:nvPr/>
+        </p:nvSpPr>
+        <p:spPr>
+          <a:xfrm>
+            <a:off x="4648200" y="4691500"/>
+            <a:ext cx="3733800" cy="276999"/>
+          </a:xfrm>
+          <a:prstGeom prst="rect">
+            <a:avLst/>
+          </a:prstGeom>
+          <a:noFill/>
+        </p:spPr>
+        <p:txBody>
+          <a:bodyPr wrap="square" rtlCol="0">
+            <a:spAutoFit/>
+          </a:bodyPr>
+          <a:lstStyle/>
+          <a:p>
+            <a:r>
+              <a:rPr lang="en-US" sz="1200" dirty="0">
+                <a:latin typeface="Verdana" panose="020B0604030504040204" pitchFamily="34" charset="0"/>
+                <a:ea typeface="Verdana" panose="020B0604030504040204" pitchFamily="34" charset="0"/>
+                <a:cs typeface="Verdana" panose="020B0604030504040204" pitchFamily="34" charset="0"/>
+              </a:rPr>
+              <a:t>Cumulated Emergency Break Duration</a:t>
+            </a:r>
+            <a:endParaRPr lang="en-GB" sz="1200" dirty="0">
+              <a:latin typeface="Verdana" panose="020B0604030504040204" pitchFamily="34" charset="0"/>
+              <a:ea typeface="Verdana" panose="020B0604030504040204" pitchFamily="34" charset="0"/>
+              <a:cs typeface="Verdana" panose="020B0604030504040204" pitchFamily="34" charset="0"/>
+            </a:endParaRPr>
+          </a:p>
+        </p:txBody>
+      </p:sp>
+    </p:spTree>
+    <p:extLst>
+      <p:ext uri="{BB962C8B-B14F-4D97-AF65-F5344CB8AC3E}">
+        <p14:creationId xmlns:p14="http://schemas.microsoft.com/office/powerpoint/2010/main" val="1317702562"/>
       </p:ext>
     </p:extLst>
   </p:cSld>
@@ -39236,50 +38469,58 @@
 </file>
 
 <file path=customXml/item1.xml><?xml version="1.0" encoding="utf-8"?>
-<Control xmlns="http://schemas.microsoft.com/VisualStudio/2011/storyboarding/control">
-  <Id Name="7b1e8fd2-01a1-426b-bd91-61729c4fb15a" Revision="1" Stencil="System.MyShapes" StencilVersion="1.0"/>
-</Control>
+<?mso-contentType ?>
+<FormTemplates xmlns="http://schemas.microsoft.com/sharepoint/v3/contenttype/forms">
+  <Display>DocumentLibraryForm</Display>
+  <Edit>DocumentLibraryForm</Edit>
+  <New>DocumentLibraryForm</New>
+</FormTemplates>
 </file>
 
 <file path=customXml/item2.xml><?xml version="1.0" encoding="utf-8"?>
-<p:properties xmlns:p="http://schemas.microsoft.com/office/2006/metadata/properties" xmlns:xsi="http://www.w3.org/2001/XMLSchema-instance" xmlns:pc="http://schemas.microsoft.com/office/infopath/2007/PartnerControls">
-  <documentManagement>
-    <TaxCatchAll xmlns="f1a71434-0d91-413c-8244-2da1ec183ffe">
-      <Value>136</Value>
-      <Value>137</Value>
-      <Value>129</Value>
-    </TaxCatchAll>
-    <d0b44e12a34441d7b789960ca4dd9919 xmlns="d274069b-2277-42e2-80a9-4bd7f308c00b">
-      <Terms xmlns="http://schemas.microsoft.com/office/infopath/2007/PartnerControls">
-        <TermInfo xmlns="http://schemas.microsoft.com/office/infopath/2007/PartnerControls">
-          <TermName xmlns="http://schemas.microsoft.com/office/infopath/2007/PartnerControls">Marketing Programs</TermName>
-          <TermId xmlns="http://schemas.microsoft.com/office/infopath/2007/PartnerControls">1aebc9a9-c0ae-4d24-be3d-3c5d2c320ab2</TermId>
-        </TermInfo>
-      </Terms>
-    </d0b44e12a34441d7b789960ca4dd9919>
-    <fcccf9be13a64ad1ae8af8e820bba783 xmlns="d274069b-2277-42e2-80a9-4bd7f308c00b">
-      <Terms xmlns="http://schemas.microsoft.com/office/infopath/2007/PartnerControls">
-        <TermInfo xmlns="http://schemas.microsoft.com/office/infopath/2007/PartnerControls">
-          <TermName xmlns="http://schemas.microsoft.com/office/infopath/2007/PartnerControls">VM</TermName>
-          <TermId xmlns="http://schemas.microsoft.com/office/infopath/2007/PartnerControls">bd2f5117-ca94-4bb7-b283-52aba514be58</TermId>
-        </TermInfo>
-      </Terms>
-    </fcccf9be13a64ad1ae8af8e820bba783>
-    <b65016e8b7834dd391d878bcc1e95df9 xmlns="d274069b-2277-42e2-80a9-4bd7f308c00b">
-      <Terms xmlns="http://schemas.microsoft.com/office/infopath/2007/PartnerControls">
-        <TermInfo xmlns="http://schemas.microsoft.com/office/infopath/2007/PartnerControls">
-          <TermName xmlns="http://schemas.microsoft.com/office/infopath/2007/PartnerControls">Brand</TermName>
-          <TermId xmlns="http://schemas.microsoft.com/office/infopath/2007/PartnerControls">18ae1b75-b608-469b-8309-216975579f08</TermId>
-        </TermInfo>
-      </Terms>
-    </b65016e8b7834dd391d878bcc1e95df9>
-    <_dlc_DocId xmlns="f1a71434-0d91-413c-8244-2da1ec183ffe">SPZKCYURJ6HQ-668101000-53</_dlc_DocId>
-    <_dlc_DocIdUrl xmlns="f1a71434-0d91-413c-8244-2da1ec183ffe">
-      <Url>https://desktop.avl.com/corp/01/0034/07/_layouts/15/DocIdRedir.aspx?ID=SPZKCYURJ6HQ-668101000-53</Url>
-      <Description>SPZKCYURJ6HQ-668101000-53</Description>
-    </_dlc_DocIdUrl>
-  </documentManagement>
-</p:properties>
+<?mso-contentType ?>
+<spe:Receivers xmlns:spe="http://schemas.microsoft.com/sharepoint/events">
+  <Receiver>
+    <Name>Document ID Generator</Name>
+    <Synchronization>Synchronous</Synchronization>
+    <Type>10001</Type>
+    <SequenceNumber>1000</SequenceNumber>
+    <Assembly>Microsoft.Office.DocumentManagement, Version=14.0.0.0, Culture=neutral, PublicKeyToken=71e9bce111e9429c</Assembly>
+    <Class>Microsoft.Office.DocumentManagement.Internal.DocIdHandler</Class>
+    <Data/>
+    <Filter/>
+  </Receiver>
+  <Receiver>
+    <Name>Document ID Generator</Name>
+    <Synchronization>Synchronous</Synchronization>
+    <Type>10002</Type>
+    <SequenceNumber>1001</SequenceNumber>
+    <Assembly>Microsoft.Office.DocumentManagement, Version=14.0.0.0, Culture=neutral, PublicKeyToken=71e9bce111e9429c</Assembly>
+    <Class>Microsoft.Office.DocumentManagement.Internal.DocIdHandler</Class>
+    <Data/>
+    <Filter/>
+  </Receiver>
+  <Receiver>
+    <Name>Document ID Generator</Name>
+    <Synchronization>Synchronous</Synchronization>
+    <Type>10004</Type>
+    <SequenceNumber>1002</SequenceNumber>
+    <Assembly>Microsoft.Office.DocumentManagement, Version=14.0.0.0, Culture=neutral, PublicKeyToken=71e9bce111e9429c</Assembly>
+    <Class>Microsoft.Office.DocumentManagement.Internal.DocIdHandler</Class>
+    <Data/>
+    <Filter/>
+  </Receiver>
+  <Receiver>
+    <Name>Document ID Generator</Name>
+    <Synchronization>Synchronous</Synchronization>
+    <Type>10006</Type>
+    <SequenceNumber>1003</SequenceNumber>
+    <Assembly>Microsoft.Office.DocumentManagement, Version=14.0.0.0, Culture=neutral, PublicKeyToken=71e9bce111e9429c</Assembly>
+    <Class>Microsoft.Office.DocumentManagement.Internal.DocIdHandler</Class>
+    <Data/>
+    <Filter/>
+  </Receiver>
+</spe:Receivers>
 </file>
 
 <file path=customXml/item3.xml><?xml version="1.0" encoding="utf-8"?>
@@ -39469,81 +38710,64 @@
 </file>
 
 <file path=customXml/item4.xml><?xml version="1.0" encoding="utf-8"?>
-<?mso-contentType ?>
-<spe:Receivers xmlns:spe="http://schemas.microsoft.com/sharepoint/events">
-  <Receiver>
-    <Name>Document ID Generator</Name>
-    <Synchronization>Synchronous</Synchronization>
-    <Type>10001</Type>
-    <SequenceNumber>1000</SequenceNumber>
-    <Assembly>Microsoft.Office.DocumentManagement, Version=14.0.0.0, Culture=neutral, PublicKeyToken=71e9bce111e9429c</Assembly>
-    <Class>Microsoft.Office.DocumentManagement.Internal.DocIdHandler</Class>
-    <Data/>
-    <Filter/>
-  </Receiver>
-  <Receiver>
-    <Name>Document ID Generator</Name>
-    <Synchronization>Synchronous</Synchronization>
-    <Type>10002</Type>
-    <SequenceNumber>1001</SequenceNumber>
-    <Assembly>Microsoft.Office.DocumentManagement, Version=14.0.0.0, Culture=neutral, PublicKeyToken=71e9bce111e9429c</Assembly>
-    <Class>Microsoft.Office.DocumentManagement.Internal.DocIdHandler</Class>
-    <Data/>
-    <Filter/>
-  </Receiver>
-  <Receiver>
-    <Name>Document ID Generator</Name>
-    <Synchronization>Synchronous</Synchronization>
-    <Type>10004</Type>
-    <SequenceNumber>1002</SequenceNumber>
-    <Assembly>Microsoft.Office.DocumentManagement, Version=14.0.0.0, Culture=neutral, PublicKeyToken=71e9bce111e9429c</Assembly>
-    <Class>Microsoft.Office.DocumentManagement.Internal.DocIdHandler</Class>
-    <Data/>
-    <Filter/>
-  </Receiver>
-  <Receiver>
-    <Name>Document ID Generator</Name>
-    <Synchronization>Synchronous</Synchronization>
-    <Type>10006</Type>
-    <SequenceNumber>1003</SequenceNumber>
-    <Assembly>Microsoft.Office.DocumentManagement, Version=14.0.0.0, Culture=neutral, PublicKeyToken=71e9bce111e9429c</Assembly>
-    <Class>Microsoft.Office.DocumentManagement.Internal.DocIdHandler</Class>
-    <Data/>
-    <Filter/>
-  </Receiver>
-</spe:Receivers>
+<p:properties xmlns:p="http://schemas.microsoft.com/office/2006/metadata/properties" xmlns:xsi="http://www.w3.org/2001/XMLSchema-instance" xmlns:pc="http://schemas.microsoft.com/office/infopath/2007/PartnerControls">
+  <documentManagement>
+    <TaxCatchAll xmlns="f1a71434-0d91-413c-8244-2da1ec183ffe">
+      <Value>136</Value>
+      <Value>137</Value>
+      <Value>129</Value>
+    </TaxCatchAll>
+    <d0b44e12a34441d7b789960ca4dd9919 xmlns="d274069b-2277-42e2-80a9-4bd7f308c00b">
+      <Terms xmlns="http://schemas.microsoft.com/office/infopath/2007/PartnerControls">
+        <TermInfo xmlns="http://schemas.microsoft.com/office/infopath/2007/PartnerControls">
+          <TermName xmlns="http://schemas.microsoft.com/office/infopath/2007/PartnerControls">Marketing Programs</TermName>
+          <TermId xmlns="http://schemas.microsoft.com/office/infopath/2007/PartnerControls">1aebc9a9-c0ae-4d24-be3d-3c5d2c320ab2</TermId>
+        </TermInfo>
+      </Terms>
+    </d0b44e12a34441d7b789960ca4dd9919>
+    <fcccf9be13a64ad1ae8af8e820bba783 xmlns="d274069b-2277-42e2-80a9-4bd7f308c00b">
+      <Terms xmlns="http://schemas.microsoft.com/office/infopath/2007/PartnerControls">
+        <TermInfo xmlns="http://schemas.microsoft.com/office/infopath/2007/PartnerControls">
+          <TermName xmlns="http://schemas.microsoft.com/office/infopath/2007/PartnerControls">VM</TermName>
+          <TermId xmlns="http://schemas.microsoft.com/office/infopath/2007/PartnerControls">bd2f5117-ca94-4bb7-b283-52aba514be58</TermId>
+        </TermInfo>
+      </Terms>
+    </fcccf9be13a64ad1ae8af8e820bba783>
+    <b65016e8b7834dd391d878bcc1e95df9 xmlns="d274069b-2277-42e2-80a9-4bd7f308c00b">
+      <Terms xmlns="http://schemas.microsoft.com/office/infopath/2007/PartnerControls">
+        <TermInfo xmlns="http://schemas.microsoft.com/office/infopath/2007/PartnerControls">
+          <TermName xmlns="http://schemas.microsoft.com/office/infopath/2007/PartnerControls">Brand</TermName>
+          <TermId xmlns="http://schemas.microsoft.com/office/infopath/2007/PartnerControls">18ae1b75-b608-469b-8309-216975579f08</TermId>
+        </TermInfo>
+      </Terms>
+    </b65016e8b7834dd391d878bcc1e95df9>
+    <_dlc_DocId xmlns="f1a71434-0d91-413c-8244-2da1ec183ffe">SPZKCYURJ6HQ-668101000-53</_dlc_DocId>
+    <_dlc_DocIdUrl xmlns="f1a71434-0d91-413c-8244-2da1ec183ffe">
+      <Url>https://desktop.avl.com/corp/01/0034/07/_layouts/15/DocIdRedir.aspx?ID=SPZKCYURJ6HQ-668101000-53</Url>
+      <Description>SPZKCYURJ6HQ-668101000-53</Description>
+    </_dlc_DocIdUrl>
+  </documentManagement>
+</p:properties>
 </file>
 
 <file path=customXml/item5.xml><?xml version="1.0" encoding="utf-8"?>
-<?mso-contentType ?>
-<FormTemplates xmlns="http://schemas.microsoft.com/sharepoint/v3/contenttype/forms">
-  <Display>DocumentLibraryForm</Display>
-  <Edit>DocumentLibraryForm</Edit>
-  <New>DocumentLibraryForm</New>
-</FormTemplates>
+<Control xmlns="http://schemas.microsoft.com/VisualStudio/2011/storyboarding/control">
+  <Id Name="7b1e8fd2-01a1-426b-bd91-61729c4fb15a" Revision="1" Stencil="System.MyShapes" StencilVersion="1.0"/>
+</Control>
 </file>
 
 <file path=customXml/itemProps1.xml><?xml version="1.0" encoding="utf-8"?>
-<ds:datastoreItem xmlns:ds="http://schemas.openxmlformats.org/officeDocument/2006/customXml" ds:itemID="{B59ABD6C-A61F-4121-BC23-522623C25B78}">
+<ds:datastoreItem xmlns:ds="http://schemas.openxmlformats.org/officeDocument/2006/customXml" ds:itemID="{242270D3-6CE7-4FFA-8CA3-54347467741C}">
   <ds:schemaRefs>
-    <ds:schemaRef ds:uri="http://schemas.microsoft.com/VisualStudio/2011/storyboarding/control"/>
+    <ds:schemaRef ds:uri="http://schemas.microsoft.com/sharepoint/v3/contenttype/forms"/>
   </ds:schemaRefs>
 </ds:datastoreItem>
 </file>
 
 <file path=customXml/itemProps2.xml><?xml version="1.0" encoding="utf-8"?>
-<ds:datastoreItem xmlns:ds="http://schemas.openxmlformats.org/officeDocument/2006/customXml" ds:itemID="{3C5827DD-BA94-4E04-9AD1-9D4EFECB0EB7}">
+<ds:datastoreItem xmlns:ds="http://schemas.openxmlformats.org/officeDocument/2006/customXml" ds:itemID="{A21206DA-39E7-48E0-80F2-7813B753AF86}">
   <ds:schemaRefs>
-    <ds:schemaRef ds:uri="http://purl.org/dc/terms/"/>
-    <ds:schemaRef ds:uri="http://schemas.openxmlformats.org/package/2006/metadata/core-properties"/>
-    <ds:schemaRef ds:uri="http://schemas.microsoft.com/office/2006/documentManagement/types"/>
-    <ds:schemaRef ds:uri="http://schemas.microsoft.com/office/infopath/2007/PartnerControls"/>
-    <ds:schemaRef ds:uri="http://purl.org/dc/elements/1.1/"/>
-    <ds:schemaRef ds:uri="http://schemas.microsoft.com/office/2006/metadata/properties"/>
-    <ds:schemaRef ds:uri="d274069b-2277-42e2-80a9-4bd7f308c00b"/>
-    <ds:schemaRef ds:uri="f1a71434-0d91-413c-8244-2da1ec183ffe"/>
-    <ds:schemaRef ds:uri="http://www.w3.org/XML/1998/namespace"/>
-    <ds:schemaRef ds:uri="http://purl.org/dc/dcmitype/"/>
+    <ds:schemaRef ds:uri="http://schemas.microsoft.com/sharepoint/events"/>
   </ds:schemaRefs>
 </ds:datastoreItem>
 </file>
@@ -39568,17 +38792,26 @@
 </file>
 
 <file path=customXml/itemProps4.xml><?xml version="1.0" encoding="utf-8"?>
-<ds:datastoreItem xmlns:ds="http://schemas.openxmlformats.org/officeDocument/2006/customXml" ds:itemID="{A21206DA-39E7-48E0-80F2-7813B753AF86}">
+<ds:datastoreItem xmlns:ds="http://schemas.openxmlformats.org/officeDocument/2006/customXml" ds:itemID="{3C5827DD-BA94-4E04-9AD1-9D4EFECB0EB7}">
   <ds:schemaRefs>
-    <ds:schemaRef ds:uri="http://schemas.microsoft.com/sharepoint/events"/>
+    <ds:schemaRef ds:uri="http://purl.org/dc/terms/"/>
+    <ds:schemaRef ds:uri="http://schemas.openxmlformats.org/package/2006/metadata/core-properties"/>
+    <ds:schemaRef ds:uri="http://schemas.microsoft.com/office/2006/documentManagement/types"/>
+    <ds:schemaRef ds:uri="http://schemas.microsoft.com/office/infopath/2007/PartnerControls"/>
+    <ds:schemaRef ds:uri="http://purl.org/dc/elements/1.1/"/>
+    <ds:schemaRef ds:uri="http://schemas.microsoft.com/office/2006/metadata/properties"/>
+    <ds:schemaRef ds:uri="d274069b-2277-42e2-80a9-4bd7f308c00b"/>
+    <ds:schemaRef ds:uri="f1a71434-0d91-413c-8244-2da1ec183ffe"/>
+    <ds:schemaRef ds:uri="http://www.w3.org/XML/1998/namespace"/>
+    <ds:schemaRef ds:uri="http://purl.org/dc/dcmitype/"/>
   </ds:schemaRefs>
 </ds:datastoreItem>
 </file>
 
 <file path=customXml/itemProps5.xml><?xml version="1.0" encoding="utf-8"?>
-<ds:datastoreItem xmlns:ds="http://schemas.openxmlformats.org/officeDocument/2006/customXml" ds:itemID="{242270D3-6CE7-4FFA-8CA3-54347467741C}">
+<ds:datastoreItem xmlns:ds="http://schemas.openxmlformats.org/officeDocument/2006/customXml" ds:itemID="{B59ABD6C-A61F-4121-BC23-522623C25B78}">
   <ds:schemaRefs>
-    <ds:schemaRef ds:uri="http://schemas.microsoft.com/sharepoint/v3/contenttype/forms"/>
+    <ds:schemaRef ds:uri="http://schemas.microsoft.com/VisualStudio/2011/storyboarding/control"/>
   </ds:schemaRefs>
 </ds:datastoreItem>
 </file>
</xml_diff>

<commit_message>
added improvements. removed interaction F:G
</commit_message>
<xml_diff>
--- a/figures/encodings.pptx
+++ b/figures/encodings.pptx
@@ -301,7 +301,7 @@
             <a:fld id="{06F053B8-FB04-4AB0-A080-AB7AE9E56315}" type="datetimeFigureOut">
               <a:rPr lang="de-DE" smtClean="0"/>
               <a:pPr/>
-              <a:t>01.12.2023</a:t>
+              <a:t>04.12.2023</a:t>
             </a:fld>
             <a:endParaRPr lang="de-DE" dirty="0"/>
           </a:p>
@@ -468,7 +468,7 @@
             <a:fld id="{A4D91BE1-7962-4D26-99A9-07CE70F19314}" type="datetimeFigureOut">
               <a:rPr lang="de-DE" smtClean="0"/>
               <a:pPr/>
-              <a:t>01.12.2023</a:t>
+              <a:t>04.12.2023</a:t>
             </a:fld>
             <a:endParaRPr lang="de-DE" dirty="0"/>
           </a:p>
@@ -35915,8 +35915,8 @@
         </p:nvSpPr>
         <p:spPr>
           <a:xfrm>
-            <a:off x="315137" y="1885235"/>
-            <a:ext cx="5923404" cy="1877437"/>
+            <a:off x="319755" y="1962382"/>
+            <a:ext cx="6385845" cy="1224000"/>
           </a:xfrm>
           <a:prstGeom prst="flowChartProcess">
             <a:avLst/>
@@ -35938,7 +35938,7 @@
           </a:fontRef>
         </p:style>
         <p:txBody>
-          <a:bodyPr wrap="square" tIns="182880" bIns="182880" numCol="2" rtlCol="0" anchor="ctr">
+          <a:bodyPr wrap="square" tIns="182880" bIns="182880" numCol="2" rtlCol="0" anchor="t">
             <a:spAutoFit/>
           </a:bodyPr>
           <a:lstStyle/>
@@ -35967,6 +35967,9 @@
             </a:r>
           </a:p>
           <a:p>
+            <a:endParaRPr lang="en-US" sz="1400" noProof="1"/>
+          </a:p>
+          <a:p>
             <a:r>
               <a:rPr lang="en-US" sz="1400" noProof="1"/>
               <a:t>4 = LaneChange(left, 3)</a:t>
@@ -35987,37 +35990,7 @@
           <a:p>
             <a:r>
               <a:rPr lang="en-US" sz="1400" noProof="1"/>
-              <a:t>7 = LaneOffset(0.9)</a:t>
-            </a:r>
-          </a:p>
-          <a:p>
-            <a:r>
-              <a:rPr lang="en-US" sz="1400" noProof="1"/>
-              <a:t>8 = LaneOffset(0.5)</a:t>
-            </a:r>
-          </a:p>
-          <a:p>
-            <a:r>
-              <a:rPr lang="en-US" sz="1400" noProof="1"/>
-              <a:t>9 = LaneOffset(0.0)</a:t>
-            </a:r>
-          </a:p>
-          <a:p>
-            <a:r>
-              <a:rPr lang="en-US" sz="1400" noProof="1"/>
-              <a:t>10 = LaneOffset(-0.5)</a:t>
-            </a:r>
-          </a:p>
-          <a:p>
-            <a:r>
-              <a:rPr lang="en-US" sz="1400" noProof="1"/>
-              <a:t>11 = LaneOffset(-0.9)</a:t>
-            </a:r>
-          </a:p>
-          <a:p>
-            <a:r>
-              <a:rPr lang="en-US" sz="1400" noProof="1"/>
-              <a:t>12 …</a:t>
+              <a:t>7 …</a:t>
             </a:r>
           </a:p>
           <a:p>
@@ -36027,10 +36000,10 @@
       </p:sp>
       <p:sp>
         <p:nvSpPr>
-          <p:cNvPr id="6" name="Rectangle 5">
-            <a:extLst>
-              <a:ext uri="{FF2B5EF4-FFF2-40B4-BE49-F238E27FC236}">
-                <a16:creationId xmlns:a16="http://schemas.microsoft.com/office/drawing/2014/main" id="{72F5B317-CB15-B27A-6F40-297356EDF8A5}"/>
+          <p:cNvPr id="8" name="Rectangle 7">
+            <a:extLst>
+              <a:ext uri="{FF2B5EF4-FFF2-40B4-BE49-F238E27FC236}">
+                <a16:creationId xmlns:a16="http://schemas.microsoft.com/office/drawing/2014/main" id="{6E57A600-1F33-72A6-2752-1ED8BC8966CD}"/>
               </a:ext>
             </a:extLst>
           </p:cNvPr>
@@ -36039,180 +36012,8 @@
         </p:nvSpPr>
         <p:spPr>
           <a:xfrm>
-            <a:off x="6858000" y="4817549"/>
-            <a:ext cx="5199569" cy="1018216"/>
-          </a:xfrm>
-          <a:prstGeom prst="rect">
-            <a:avLst/>
-          </a:prstGeom>
-          <a:ln/>
-        </p:spPr>
-        <p:style>
-          <a:lnRef idx="2">
-            <a:schemeClr val="accent4"/>
-          </a:lnRef>
-          <a:fillRef idx="1">
-            <a:schemeClr val="lt1"/>
-          </a:fillRef>
-          <a:effectRef idx="0">
-            <a:schemeClr val="accent4"/>
-          </a:effectRef>
-          <a:fontRef idx="minor">
-            <a:schemeClr val="dk1"/>
-          </a:fontRef>
-        </p:style>
-        <p:txBody>
-          <a:bodyPr numCol="2" rtlCol="0" anchor="t"/>
-          <a:lstStyle/>
-          <a:p>
-            <a:r>
-              <a:rPr lang="en-US" sz="1400" dirty="0">
-                <a:solidFill>
-                  <a:srgbClr val="00B050"/>
-                </a:solidFill>
-              </a:rPr>
-              <a:t>+</a:t>
-            </a:r>
-            <a:r>
-              <a:rPr lang="en-US" sz="1400" dirty="0"/>
-              <a:t> maps exactly to problem</a:t>
-            </a:r>
-          </a:p>
-          <a:p>
-            <a:r>
-              <a:rPr lang="en-US" sz="1400" dirty="0">
-                <a:solidFill>
-                  <a:srgbClr val="00B050"/>
-                </a:solidFill>
-              </a:rPr>
-              <a:t>+ </a:t>
-            </a:r>
-            <a:r>
-              <a:rPr lang="en-US" sz="1400" dirty="0">
-                <a:solidFill>
-                  <a:schemeClr val="tx1"/>
-                </a:solidFill>
-              </a:rPr>
-              <a:t>more control over parameters of actions</a:t>
-            </a:r>
-          </a:p>
-          <a:p>
-            <a:endParaRPr lang="en-US" sz="1400" dirty="0">
-              <a:solidFill>
-                <a:srgbClr val="E50046"/>
-              </a:solidFill>
-            </a:endParaRPr>
-          </a:p>
-          <a:p>
-            <a:r>
-              <a:rPr lang="en-US" sz="1400" dirty="0">
-                <a:solidFill>
-                  <a:srgbClr val="E50046"/>
-                </a:solidFill>
-              </a:rPr>
-              <a:t>- </a:t>
-            </a:r>
-            <a:r>
-              <a:rPr lang="en-US" sz="1400" dirty="0">
-                <a:solidFill>
-                  <a:schemeClr val="tx1"/>
-                </a:solidFill>
-              </a:rPr>
-              <a:t>larger search space</a:t>
-            </a:r>
-          </a:p>
-          <a:p>
-            <a:r>
-              <a:rPr lang="en-US" sz="1400" dirty="0">
-                <a:solidFill>
-                  <a:srgbClr val="E50046"/>
-                </a:solidFill>
-              </a:rPr>
-              <a:t>-</a:t>
-            </a:r>
-            <a:r>
-              <a:rPr lang="en-US" sz="1400" dirty="0">
-                <a:solidFill>
-                  <a:srgbClr val="C00000"/>
-                </a:solidFill>
-              </a:rPr>
-              <a:t> </a:t>
-            </a:r>
-            <a:r>
-              <a:rPr lang="en-US" sz="1400" dirty="0">
-                <a:solidFill>
-                  <a:schemeClr val="tx1"/>
-                </a:solidFill>
-              </a:rPr>
-              <a:t>genes will have different lengths</a:t>
-            </a:r>
-            <a:endParaRPr lang="en-US" sz="1400" dirty="0">
-              <a:solidFill>
-                <a:srgbClr val="C00000"/>
-              </a:solidFill>
-            </a:endParaRPr>
-          </a:p>
-        </p:txBody>
-      </p:sp>
-      <p:cxnSp>
-        <p:nvCxnSpPr>
-          <p:cNvPr id="7" name="Straight Arrow Connector 6">
-            <a:extLst>
-              <a:ext uri="{FF2B5EF4-FFF2-40B4-BE49-F238E27FC236}">
-                <a16:creationId xmlns:a16="http://schemas.microsoft.com/office/drawing/2014/main" id="{6420A8A3-B70D-6A10-EB55-3458202C44CB}"/>
-              </a:ext>
-            </a:extLst>
-          </p:cNvPr>
-          <p:cNvCxnSpPr>
-            <a:cxnSpLocks/>
-            <a:stCxn id="8" idx="3"/>
-            <a:endCxn id="6" idx="1"/>
-          </p:cNvCxnSpPr>
-          <p:nvPr/>
-        </p:nvCxnSpPr>
-        <p:spPr>
-          <a:xfrm flipV="1">
-            <a:off x="6705600" y="5326657"/>
-            <a:ext cx="152400" cy="1"/>
-          </a:xfrm>
-          <a:prstGeom prst="straightConnector1">
-            <a:avLst/>
-          </a:prstGeom>
-          <a:ln>
-            <a:tailEnd type="triangle"/>
-          </a:ln>
-        </p:spPr>
-        <p:style>
-          <a:lnRef idx="2">
-            <a:schemeClr val="accent4"/>
-          </a:lnRef>
-          <a:fillRef idx="0">
-            <a:schemeClr val="accent4"/>
-          </a:fillRef>
-          <a:effectRef idx="1">
-            <a:schemeClr val="accent4"/>
-          </a:effectRef>
-          <a:fontRef idx="minor">
-            <a:schemeClr val="tx1"/>
-          </a:fontRef>
-        </p:style>
-      </p:cxnSp>
-      <p:sp>
-        <p:nvSpPr>
-          <p:cNvPr id="8" name="Rectangle 7">
-            <a:extLst>
-              <a:ext uri="{FF2B5EF4-FFF2-40B4-BE49-F238E27FC236}">
-                <a16:creationId xmlns:a16="http://schemas.microsoft.com/office/drawing/2014/main" id="{6E57A600-1F33-72A6-2752-1ED8BC8966CD}"/>
-              </a:ext>
-            </a:extLst>
-          </p:cNvPr>
-          <p:cNvSpPr/>
-          <p:nvPr/>
-        </p:nvSpPr>
-        <p:spPr>
-          <a:xfrm>
-            <a:off x="315137" y="4633516"/>
-            <a:ext cx="6390463" cy="1386283"/>
+            <a:off x="315137" y="4633517"/>
+            <a:ext cx="6390463" cy="1188000"/>
           </a:xfrm>
           <a:prstGeom prst="rect">
             <a:avLst/>
@@ -36234,14 +36035,8 @@
           </a:fontRef>
         </p:style>
         <p:txBody>
-          <a:bodyPr rtlCol="0" anchor="t"/>
+          <a:bodyPr rtlCol="0" anchor="ctr"/>
           <a:lstStyle/>
-          <a:p>
-            <a:r>
-              <a:rPr lang="en-US" sz="1400" dirty="0"/>
-              <a:t>Examples:</a:t>
-            </a:r>
-          </a:p>
           <a:p>
             <a:r>
               <a:rPr lang="en-US" sz="1400" dirty="0"/>
@@ -36283,23 +36078,12 @@
             </a:r>
             <a:r>
               <a:rPr lang="en-US" sz="1400" dirty="0" err="1"/>
-              <a:t>LaneOffset</a:t>
+              <a:t>ModifyTargetVelocity</a:t>
             </a:r>
             <a:r>
               <a:rPr lang="en-US" sz="1400" dirty="0"/>
-              <a:t>“, “</a:t>
-            </a:r>
-            <a:r>
-              <a:rPr lang="en-US" sz="1400" dirty="0" err="1"/>
-              <a:t>offset_percentage</a:t>
-            </a:r>
-            <a:r>
-              <a:rPr lang="en-US" sz="1400" dirty="0"/>
-              <a:t>“: “0.6”}</a:t>
-            </a:r>
-          </a:p>
-          <a:p>
-            <a:endParaRPr lang="en-US" sz="1400" dirty="0"/>
+              <a:t>“, “percentage“: “133.4”}</a:t>
+            </a:r>
           </a:p>
         </p:txBody>
       </p:sp>
@@ -36411,150 +36195,6 @@
           </a:p>
         </p:txBody>
       </p:sp>
-      <p:sp>
-        <p:nvSpPr>
-          <p:cNvPr id="19" name="Rectangle 18">
-            <a:extLst>
-              <a:ext uri="{FF2B5EF4-FFF2-40B4-BE49-F238E27FC236}">
-                <a16:creationId xmlns:a16="http://schemas.microsoft.com/office/drawing/2014/main" id="{E8DE9852-9925-878F-7E98-BD8368D35354}"/>
-              </a:ext>
-            </a:extLst>
-          </p:cNvPr>
-          <p:cNvSpPr/>
-          <p:nvPr/>
-        </p:nvSpPr>
-        <p:spPr>
-          <a:xfrm>
-            <a:off x="6858000" y="2382953"/>
-            <a:ext cx="5199569" cy="882000"/>
-          </a:xfrm>
-          <a:prstGeom prst="rect">
-            <a:avLst/>
-          </a:prstGeom>
-          <a:ln/>
-        </p:spPr>
-        <p:style>
-          <a:lnRef idx="2">
-            <a:schemeClr val="accent4"/>
-          </a:lnRef>
-          <a:fillRef idx="1">
-            <a:schemeClr val="lt1"/>
-          </a:fillRef>
-          <a:effectRef idx="0">
-            <a:schemeClr val="accent4"/>
-          </a:effectRef>
-          <a:fontRef idx="minor">
-            <a:schemeClr val="dk1"/>
-          </a:fontRef>
-        </p:style>
-        <p:txBody>
-          <a:bodyPr numCol="2" rtlCol="0" anchor="t"/>
-          <a:lstStyle/>
-          <a:p>
-            <a:r>
-              <a:rPr lang="en-US" sz="1400" dirty="0">
-                <a:solidFill>
-                  <a:srgbClr val="00B050"/>
-                </a:solidFill>
-              </a:rPr>
-              <a:t>+ </a:t>
-            </a:r>
-            <a:r>
-              <a:rPr lang="en-US" sz="1400" dirty="0">
-                <a:solidFill>
-                  <a:schemeClr val="tx1"/>
-                </a:solidFill>
-              </a:rPr>
-              <a:t>simple mutation</a:t>
-            </a:r>
-          </a:p>
-          <a:p>
-            <a:r>
-              <a:rPr lang="en-US" sz="1400" dirty="0">
-                <a:solidFill>
-                  <a:srgbClr val="00B050"/>
-                </a:solidFill>
-              </a:rPr>
-              <a:t>+ </a:t>
-            </a:r>
-            <a:r>
-              <a:rPr lang="en-US" sz="1400" dirty="0">
-                <a:solidFill>
-                  <a:schemeClr val="tx1"/>
-                </a:solidFill>
-              </a:rPr>
-              <a:t>simple encoding</a:t>
-            </a:r>
-            <a:endParaRPr lang="en-US" sz="1400" dirty="0"/>
-          </a:p>
-          <a:p>
-            <a:r>
-              <a:rPr lang="en-US" sz="1400" dirty="0">
-                <a:solidFill>
-                  <a:srgbClr val="00B050"/>
-                </a:solidFill>
-              </a:rPr>
-              <a:t>+ </a:t>
-            </a:r>
-            <a:r>
-              <a:rPr lang="en-US" sz="1400" dirty="0">
-                <a:solidFill>
-                  <a:schemeClr val="tx1"/>
-                </a:solidFill>
-              </a:rPr>
-              <a:t>smaller search space</a:t>
-            </a:r>
-            <a:endParaRPr lang="en-US" sz="1400" dirty="0">
-              <a:solidFill>
-                <a:srgbClr val="E50046"/>
-              </a:solidFill>
-            </a:endParaRPr>
-          </a:p>
-        </p:txBody>
-      </p:sp>
-      <p:cxnSp>
-        <p:nvCxnSpPr>
-          <p:cNvPr id="23" name="Straight Arrow Connector 22">
-            <a:extLst>
-              <a:ext uri="{FF2B5EF4-FFF2-40B4-BE49-F238E27FC236}">
-                <a16:creationId xmlns:a16="http://schemas.microsoft.com/office/drawing/2014/main" id="{DDF4E97E-C04B-4237-E79C-1D5B4343240C}"/>
-              </a:ext>
-            </a:extLst>
-          </p:cNvPr>
-          <p:cNvCxnSpPr>
-            <a:cxnSpLocks/>
-            <a:stCxn id="4" idx="3"/>
-            <a:endCxn id="19" idx="1"/>
-          </p:cNvCxnSpPr>
-          <p:nvPr/>
-        </p:nvCxnSpPr>
-        <p:spPr>
-          <a:xfrm flipV="1">
-            <a:off x="6238541" y="2823953"/>
-            <a:ext cx="619459" cy="1"/>
-          </a:xfrm>
-          <a:prstGeom prst="straightConnector1">
-            <a:avLst/>
-          </a:prstGeom>
-          <a:ln>
-            <a:tailEnd type="triangle"/>
-          </a:ln>
-        </p:spPr>
-        <p:style>
-          <a:lnRef idx="2">
-            <a:schemeClr val="accent4"/>
-          </a:lnRef>
-          <a:fillRef idx="0">
-            <a:schemeClr val="accent4"/>
-          </a:fillRef>
-          <a:effectRef idx="1">
-            <a:schemeClr val="accent4"/>
-          </a:effectRef>
-          <a:fontRef idx="minor">
-            <a:schemeClr val="tx1"/>
-          </a:fontRef>
-        </p:style>
-      </p:cxnSp>
     </p:spTree>
     <p:extLst>
       <p:ext uri="{BB962C8B-B14F-4D97-AF65-F5344CB8AC3E}">
@@ -38469,61 +38109,47 @@
 </file>
 
 <file path=customXml/item1.xml><?xml version="1.0" encoding="utf-8"?>
-<?mso-contentType ?>
-<FormTemplates xmlns="http://schemas.microsoft.com/sharepoint/v3/contenttype/forms">
-  <Display>DocumentLibraryForm</Display>
-  <Edit>DocumentLibraryForm</Edit>
-  <New>DocumentLibraryForm</New>
-</FormTemplates>
+<p:properties xmlns:p="http://schemas.microsoft.com/office/2006/metadata/properties" xmlns:xsi="http://www.w3.org/2001/XMLSchema-instance" xmlns:pc="http://schemas.microsoft.com/office/infopath/2007/PartnerControls">
+  <documentManagement>
+    <TaxCatchAll xmlns="f1a71434-0d91-413c-8244-2da1ec183ffe">
+      <Value>136</Value>
+      <Value>137</Value>
+      <Value>129</Value>
+    </TaxCatchAll>
+    <d0b44e12a34441d7b789960ca4dd9919 xmlns="d274069b-2277-42e2-80a9-4bd7f308c00b">
+      <Terms xmlns="http://schemas.microsoft.com/office/infopath/2007/PartnerControls">
+        <TermInfo xmlns="http://schemas.microsoft.com/office/infopath/2007/PartnerControls">
+          <TermName xmlns="http://schemas.microsoft.com/office/infopath/2007/PartnerControls">Marketing Programs</TermName>
+          <TermId xmlns="http://schemas.microsoft.com/office/infopath/2007/PartnerControls">1aebc9a9-c0ae-4d24-be3d-3c5d2c320ab2</TermId>
+        </TermInfo>
+      </Terms>
+    </d0b44e12a34441d7b789960ca4dd9919>
+    <fcccf9be13a64ad1ae8af8e820bba783 xmlns="d274069b-2277-42e2-80a9-4bd7f308c00b">
+      <Terms xmlns="http://schemas.microsoft.com/office/infopath/2007/PartnerControls">
+        <TermInfo xmlns="http://schemas.microsoft.com/office/infopath/2007/PartnerControls">
+          <TermName xmlns="http://schemas.microsoft.com/office/infopath/2007/PartnerControls">VM</TermName>
+          <TermId xmlns="http://schemas.microsoft.com/office/infopath/2007/PartnerControls">bd2f5117-ca94-4bb7-b283-52aba514be58</TermId>
+        </TermInfo>
+      </Terms>
+    </fcccf9be13a64ad1ae8af8e820bba783>
+    <b65016e8b7834dd391d878bcc1e95df9 xmlns="d274069b-2277-42e2-80a9-4bd7f308c00b">
+      <Terms xmlns="http://schemas.microsoft.com/office/infopath/2007/PartnerControls">
+        <TermInfo xmlns="http://schemas.microsoft.com/office/infopath/2007/PartnerControls">
+          <TermName xmlns="http://schemas.microsoft.com/office/infopath/2007/PartnerControls">Brand</TermName>
+          <TermId xmlns="http://schemas.microsoft.com/office/infopath/2007/PartnerControls">18ae1b75-b608-469b-8309-216975579f08</TermId>
+        </TermInfo>
+      </Terms>
+    </b65016e8b7834dd391d878bcc1e95df9>
+    <_dlc_DocId xmlns="f1a71434-0d91-413c-8244-2da1ec183ffe">SPZKCYURJ6HQ-668101000-53</_dlc_DocId>
+    <_dlc_DocIdUrl xmlns="f1a71434-0d91-413c-8244-2da1ec183ffe">
+      <Url>https://desktop.avl.com/corp/01/0034/07/_layouts/15/DocIdRedir.aspx?ID=SPZKCYURJ6HQ-668101000-53</Url>
+      <Description>SPZKCYURJ6HQ-668101000-53</Description>
+    </_dlc_DocIdUrl>
+  </documentManagement>
+</p:properties>
 </file>
 
 <file path=customXml/item2.xml><?xml version="1.0" encoding="utf-8"?>
-<?mso-contentType ?>
-<spe:Receivers xmlns:spe="http://schemas.microsoft.com/sharepoint/events">
-  <Receiver>
-    <Name>Document ID Generator</Name>
-    <Synchronization>Synchronous</Synchronization>
-    <Type>10001</Type>
-    <SequenceNumber>1000</SequenceNumber>
-    <Assembly>Microsoft.Office.DocumentManagement, Version=14.0.0.0, Culture=neutral, PublicKeyToken=71e9bce111e9429c</Assembly>
-    <Class>Microsoft.Office.DocumentManagement.Internal.DocIdHandler</Class>
-    <Data/>
-    <Filter/>
-  </Receiver>
-  <Receiver>
-    <Name>Document ID Generator</Name>
-    <Synchronization>Synchronous</Synchronization>
-    <Type>10002</Type>
-    <SequenceNumber>1001</SequenceNumber>
-    <Assembly>Microsoft.Office.DocumentManagement, Version=14.0.0.0, Culture=neutral, PublicKeyToken=71e9bce111e9429c</Assembly>
-    <Class>Microsoft.Office.DocumentManagement.Internal.DocIdHandler</Class>
-    <Data/>
-    <Filter/>
-  </Receiver>
-  <Receiver>
-    <Name>Document ID Generator</Name>
-    <Synchronization>Synchronous</Synchronization>
-    <Type>10004</Type>
-    <SequenceNumber>1002</SequenceNumber>
-    <Assembly>Microsoft.Office.DocumentManagement, Version=14.0.0.0, Culture=neutral, PublicKeyToken=71e9bce111e9429c</Assembly>
-    <Class>Microsoft.Office.DocumentManagement.Internal.DocIdHandler</Class>
-    <Data/>
-    <Filter/>
-  </Receiver>
-  <Receiver>
-    <Name>Document ID Generator</Name>
-    <Synchronization>Synchronous</Synchronization>
-    <Type>10006</Type>
-    <SequenceNumber>1003</SequenceNumber>
-    <Assembly>Microsoft.Office.DocumentManagement, Version=14.0.0.0, Culture=neutral, PublicKeyToken=71e9bce111e9429c</Assembly>
-    <Class>Microsoft.Office.DocumentManagement.Internal.DocIdHandler</Class>
-    <Data/>
-    <Filter/>
-  </Receiver>
-</spe:Receivers>
-</file>
-
-<file path=customXml/item3.xml><?xml version="1.0" encoding="utf-8"?>
 <ct:contentTypeSchema xmlns:ct="http://schemas.microsoft.com/office/2006/metadata/contentType" xmlns:ma="http://schemas.microsoft.com/office/2006/metadata/properties/metaAttributes" ct:_="" ma:_="" ma:contentTypeName="Document" ma:contentTypeID="0x0101002F415E939BDF7B4ABAD54620EBAD0050" ma:contentTypeVersion="9" ma:contentTypeDescription="Create a new document." ma:contentTypeScope="" ma:versionID="95e6e8432c52e5a8d68d8b5a3c763667">
   <xsd:schema xmlns:xsd="http://www.w3.org/2001/XMLSchema" xmlns:xs="http://www.w3.org/2001/XMLSchema" xmlns:p="http://schemas.microsoft.com/office/2006/metadata/properties" xmlns:ns2="f1a71434-0d91-413c-8244-2da1ec183ffe" xmlns:ns3="d274069b-2277-42e2-80a9-4bd7f308c00b" targetNamespace="http://schemas.microsoft.com/office/2006/metadata/properties" ma:root="true" ma:fieldsID="09addb2150905e914dc03bf20de489ee" ns2:_="" ns3:_="">
     <xsd:import namespace="f1a71434-0d91-413c-8244-2da1ec183ffe"/>
@@ -38709,45 +38335,59 @@
 </ct:contentTypeSchema>
 </file>
 
+<file path=customXml/item3.xml><?xml version="1.0" encoding="utf-8"?>
+<?mso-contentType ?>
+<spe:Receivers xmlns:spe="http://schemas.microsoft.com/sharepoint/events">
+  <Receiver>
+    <Name>Document ID Generator</Name>
+    <Synchronization>Synchronous</Synchronization>
+    <Type>10001</Type>
+    <SequenceNumber>1000</SequenceNumber>
+    <Assembly>Microsoft.Office.DocumentManagement, Version=14.0.0.0, Culture=neutral, PublicKeyToken=71e9bce111e9429c</Assembly>
+    <Class>Microsoft.Office.DocumentManagement.Internal.DocIdHandler</Class>
+    <Data/>
+    <Filter/>
+  </Receiver>
+  <Receiver>
+    <Name>Document ID Generator</Name>
+    <Synchronization>Synchronous</Synchronization>
+    <Type>10002</Type>
+    <SequenceNumber>1001</SequenceNumber>
+    <Assembly>Microsoft.Office.DocumentManagement, Version=14.0.0.0, Culture=neutral, PublicKeyToken=71e9bce111e9429c</Assembly>
+    <Class>Microsoft.Office.DocumentManagement.Internal.DocIdHandler</Class>
+    <Data/>
+    <Filter/>
+  </Receiver>
+  <Receiver>
+    <Name>Document ID Generator</Name>
+    <Synchronization>Synchronous</Synchronization>
+    <Type>10004</Type>
+    <SequenceNumber>1002</SequenceNumber>
+    <Assembly>Microsoft.Office.DocumentManagement, Version=14.0.0.0, Culture=neutral, PublicKeyToken=71e9bce111e9429c</Assembly>
+    <Class>Microsoft.Office.DocumentManagement.Internal.DocIdHandler</Class>
+    <Data/>
+    <Filter/>
+  </Receiver>
+  <Receiver>
+    <Name>Document ID Generator</Name>
+    <Synchronization>Synchronous</Synchronization>
+    <Type>10006</Type>
+    <SequenceNumber>1003</SequenceNumber>
+    <Assembly>Microsoft.Office.DocumentManagement, Version=14.0.0.0, Culture=neutral, PublicKeyToken=71e9bce111e9429c</Assembly>
+    <Class>Microsoft.Office.DocumentManagement.Internal.DocIdHandler</Class>
+    <Data/>
+    <Filter/>
+  </Receiver>
+</spe:Receivers>
+</file>
+
 <file path=customXml/item4.xml><?xml version="1.0" encoding="utf-8"?>
-<p:properties xmlns:p="http://schemas.microsoft.com/office/2006/metadata/properties" xmlns:xsi="http://www.w3.org/2001/XMLSchema-instance" xmlns:pc="http://schemas.microsoft.com/office/infopath/2007/PartnerControls">
-  <documentManagement>
-    <TaxCatchAll xmlns="f1a71434-0d91-413c-8244-2da1ec183ffe">
-      <Value>136</Value>
-      <Value>137</Value>
-      <Value>129</Value>
-    </TaxCatchAll>
-    <d0b44e12a34441d7b789960ca4dd9919 xmlns="d274069b-2277-42e2-80a9-4bd7f308c00b">
-      <Terms xmlns="http://schemas.microsoft.com/office/infopath/2007/PartnerControls">
-        <TermInfo xmlns="http://schemas.microsoft.com/office/infopath/2007/PartnerControls">
-          <TermName xmlns="http://schemas.microsoft.com/office/infopath/2007/PartnerControls">Marketing Programs</TermName>
-          <TermId xmlns="http://schemas.microsoft.com/office/infopath/2007/PartnerControls">1aebc9a9-c0ae-4d24-be3d-3c5d2c320ab2</TermId>
-        </TermInfo>
-      </Terms>
-    </d0b44e12a34441d7b789960ca4dd9919>
-    <fcccf9be13a64ad1ae8af8e820bba783 xmlns="d274069b-2277-42e2-80a9-4bd7f308c00b">
-      <Terms xmlns="http://schemas.microsoft.com/office/infopath/2007/PartnerControls">
-        <TermInfo xmlns="http://schemas.microsoft.com/office/infopath/2007/PartnerControls">
-          <TermName xmlns="http://schemas.microsoft.com/office/infopath/2007/PartnerControls">VM</TermName>
-          <TermId xmlns="http://schemas.microsoft.com/office/infopath/2007/PartnerControls">bd2f5117-ca94-4bb7-b283-52aba514be58</TermId>
-        </TermInfo>
-      </Terms>
-    </fcccf9be13a64ad1ae8af8e820bba783>
-    <b65016e8b7834dd391d878bcc1e95df9 xmlns="d274069b-2277-42e2-80a9-4bd7f308c00b">
-      <Terms xmlns="http://schemas.microsoft.com/office/infopath/2007/PartnerControls">
-        <TermInfo xmlns="http://schemas.microsoft.com/office/infopath/2007/PartnerControls">
-          <TermName xmlns="http://schemas.microsoft.com/office/infopath/2007/PartnerControls">Brand</TermName>
-          <TermId xmlns="http://schemas.microsoft.com/office/infopath/2007/PartnerControls">18ae1b75-b608-469b-8309-216975579f08</TermId>
-        </TermInfo>
-      </Terms>
-    </b65016e8b7834dd391d878bcc1e95df9>
-    <_dlc_DocId xmlns="f1a71434-0d91-413c-8244-2da1ec183ffe">SPZKCYURJ6HQ-668101000-53</_dlc_DocId>
-    <_dlc_DocIdUrl xmlns="f1a71434-0d91-413c-8244-2da1ec183ffe">
-      <Url>https://desktop.avl.com/corp/01/0034/07/_layouts/15/DocIdRedir.aspx?ID=SPZKCYURJ6HQ-668101000-53</Url>
-      <Description>SPZKCYURJ6HQ-668101000-53</Description>
-    </_dlc_DocIdUrl>
-  </documentManagement>
-</p:properties>
+<?mso-contentType ?>
+<FormTemplates xmlns="http://schemas.microsoft.com/sharepoint/v3/contenttype/forms">
+  <Display>DocumentLibraryForm</Display>
+  <Edit>DocumentLibraryForm</Edit>
+  <New>DocumentLibraryForm</New>
+</FormTemplates>
 </file>
 
 <file path=customXml/item5.xml><?xml version="1.0" encoding="utf-8"?>
@@ -38757,22 +38397,23 @@
 </file>
 
 <file path=customXml/itemProps1.xml><?xml version="1.0" encoding="utf-8"?>
-<ds:datastoreItem xmlns:ds="http://schemas.openxmlformats.org/officeDocument/2006/customXml" ds:itemID="{242270D3-6CE7-4FFA-8CA3-54347467741C}">
+<ds:datastoreItem xmlns:ds="http://schemas.openxmlformats.org/officeDocument/2006/customXml" ds:itemID="{3C5827DD-BA94-4E04-9AD1-9D4EFECB0EB7}">
   <ds:schemaRefs>
-    <ds:schemaRef ds:uri="http://schemas.microsoft.com/sharepoint/v3/contenttype/forms"/>
+    <ds:schemaRef ds:uri="http://purl.org/dc/terms/"/>
+    <ds:schemaRef ds:uri="http://schemas.openxmlformats.org/package/2006/metadata/core-properties"/>
+    <ds:schemaRef ds:uri="http://schemas.microsoft.com/office/2006/documentManagement/types"/>
+    <ds:schemaRef ds:uri="http://schemas.microsoft.com/office/infopath/2007/PartnerControls"/>
+    <ds:schemaRef ds:uri="http://purl.org/dc/elements/1.1/"/>
+    <ds:schemaRef ds:uri="http://schemas.microsoft.com/office/2006/metadata/properties"/>
+    <ds:schemaRef ds:uri="d274069b-2277-42e2-80a9-4bd7f308c00b"/>
+    <ds:schemaRef ds:uri="f1a71434-0d91-413c-8244-2da1ec183ffe"/>
+    <ds:schemaRef ds:uri="http://www.w3.org/XML/1998/namespace"/>
+    <ds:schemaRef ds:uri="http://purl.org/dc/dcmitype/"/>
   </ds:schemaRefs>
 </ds:datastoreItem>
 </file>
 
 <file path=customXml/itemProps2.xml><?xml version="1.0" encoding="utf-8"?>
-<ds:datastoreItem xmlns:ds="http://schemas.openxmlformats.org/officeDocument/2006/customXml" ds:itemID="{A21206DA-39E7-48E0-80F2-7813B753AF86}">
-  <ds:schemaRefs>
-    <ds:schemaRef ds:uri="http://schemas.microsoft.com/sharepoint/events"/>
-  </ds:schemaRefs>
-</ds:datastoreItem>
-</file>
-
-<file path=customXml/itemProps3.xml><?xml version="1.0" encoding="utf-8"?>
 <ds:datastoreItem xmlns:ds="http://schemas.openxmlformats.org/officeDocument/2006/customXml" ds:itemID="{10271938-B86F-4895-A370-18BAE3737F56}">
   <ds:schemaRefs>
     <ds:schemaRef ds:uri="http://schemas.microsoft.com/office/2006/metadata/contentType"/>
@@ -38791,19 +38432,18 @@
 </ds:datastoreItem>
 </file>
 
+<file path=customXml/itemProps3.xml><?xml version="1.0" encoding="utf-8"?>
+<ds:datastoreItem xmlns:ds="http://schemas.openxmlformats.org/officeDocument/2006/customXml" ds:itemID="{A21206DA-39E7-48E0-80F2-7813B753AF86}">
+  <ds:schemaRefs>
+    <ds:schemaRef ds:uri="http://schemas.microsoft.com/sharepoint/events"/>
+  </ds:schemaRefs>
+</ds:datastoreItem>
+</file>
+
 <file path=customXml/itemProps4.xml><?xml version="1.0" encoding="utf-8"?>
-<ds:datastoreItem xmlns:ds="http://schemas.openxmlformats.org/officeDocument/2006/customXml" ds:itemID="{3C5827DD-BA94-4E04-9AD1-9D4EFECB0EB7}">
+<ds:datastoreItem xmlns:ds="http://schemas.openxmlformats.org/officeDocument/2006/customXml" ds:itemID="{242270D3-6CE7-4FFA-8CA3-54347467741C}">
   <ds:schemaRefs>
-    <ds:schemaRef ds:uri="http://purl.org/dc/terms/"/>
-    <ds:schemaRef ds:uri="http://schemas.openxmlformats.org/package/2006/metadata/core-properties"/>
-    <ds:schemaRef ds:uri="http://schemas.microsoft.com/office/2006/documentManagement/types"/>
-    <ds:schemaRef ds:uri="http://schemas.microsoft.com/office/infopath/2007/PartnerControls"/>
-    <ds:schemaRef ds:uri="http://purl.org/dc/elements/1.1/"/>
-    <ds:schemaRef ds:uri="http://schemas.microsoft.com/office/2006/metadata/properties"/>
-    <ds:schemaRef ds:uri="d274069b-2277-42e2-80a9-4bd7f308c00b"/>
-    <ds:schemaRef ds:uri="f1a71434-0d91-413c-8244-2da1ec183ffe"/>
-    <ds:schemaRef ds:uri="http://www.w3.org/XML/1998/namespace"/>
-    <ds:schemaRef ds:uri="http://purl.org/dc/dcmitype/"/>
+    <ds:schemaRef ds:uri="http://schemas.microsoft.com/sharepoint/v3/contenttype/forms"/>
   </ds:schemaRefs>
 </ds:datastoreItem>
 </file>

</xml_diff>